<commit_message>
Add Grid iteration, indexing, and flat access features
- Implement __iter__ method for Grid to loop through cells
- Implement __getitem__ for accessing cells via grid[row, col] or grid[index]
- Add flat property and GridFlatIterator for flattened access like matplotlib
- Fix circular import issues in Grid class
- Add comprehensive test suite for Grid iteration features
- Reorganize grid examples with numerical prefixes:
  - 001_basic_grid.py: Basic grid creation and usage
  - 002_grid_indexing.py: Grid indexing and iteration features
  - 003_nested_grid.py: Nested grids and cell merging
  - 004_autogrid.py: Automatic grid layout features
- Add README files to document the Grid features and examples

🤖 Generated with [Claude Code](https://claude.ai/code)

Co-Authored-By: Claude <noreply@anthropic.com>
</commit_message>
<xml_diff>
--- a/output/basic_demo.pptx
+++ b/output/basic_demo.pptx
@@ -1,24 +1,24 @@
 
 <file path=ppt/presentation.xml><?xml version="1.0" encoding="utf-8"?>
-<p:presentation xmlns:a="http://schemas.openxmlformats.org/drawingml/2006/main" xmlns:r="http://schemas.openxmlformats.org/officeDocument/2006/relationships" xmlns:p="http://schemas.openxmlformats.org/presentationml/2006/main" saveSubsetFonts="1" autoCompressPictures="0">
+<p:presentation xmlns:a="http://schemas.openxmlformats.org/drawingml/2006/main" xmlns:r="http://schemas.openxmlformats.org/officeDocument/2006/relationships" xmlns:p="http://schemas.openxmlformats.org/presentationml/2006/main" saveSubsetFonts="1">
   <p:sldMasterIdLst>
     <p:sldMasterId id="2147483648" r:id="rId1"/>
   </p:sldMasterIdLst>
   <p:sldIdLst>
-    <p:sldId id="256" r:id="rId7"/>
-    <p:sldId id="257" r:id="rId8"/>
-    <p:sldId id="258" r:id="rId9"/>
-    <p:sldId id="259" r:id="rId10"/>
-    <p:sldId id="260" r:id="rId11"/>
+    <p:sldId id="256" r:id="rId6"/>
+    <p:sldId id="257" r:id="rId7"/>
+    <p:sldId id="258" r:id="rId8"/>
+    <p:sldId id="259" r:id="rId9"/>
+    <p:sldId id="260" r:id="rId10"/>
   </p:sldIdLst>
-  <p:sldSz cx="12188952" cy="6858000" type="screen4x3"/>
+  <p:sldSz cx="12188952" cy="6858000"/>
   <p:notesSz cx="6858000" cy="9144000"/>
   <p:defaultTextStyle>
     <a:defPPr>
-      <a:defRPr lang="en-US"/>
+      <a:defRPr lang="ja-JP"/>
     </a:defPPr>
-    <a:lvl1pPr marL="0" algn="l" defTabSz="457200" rtl="0" eaLnBrk="1" latinLnBrk="0" hangingPunct="1">
-      <a:defRPr sz="1800" kern="1200">
+    <a:lvl1pPr marL="0" algn="l" defTabSz="914400" rtl="0" eaLnBrk="1" latinLnBrk="0" hangingPunct="1">
+      <a:defRPr kumimoji="1" sz="1800" kern="1200">
         <a:solidFill>
           <a:schemeClr val="tx1"/>
         </a:solidFill>
@@ -27,8 +27,8 @@
         <a:cs typeface="+mn-cs"/>
       </a:defRPr>
     </a:lvl1pPr>
-    <a:lvl2pPr marL="457200" algn="l" defTabSz="457200" rtl="0" eaLnBrk="1" latinLnBrk="0" hangingPunct="1">
-      <a:defRPr sz="1800" kern="1200">
+    <a:lvl2pPr marL="457200" algn="l" defTabSz="914400" rtl="0" eaLnBrk="1" latinLnBrk="0" hangingPunct="1">
+      <a:defRPr kumimoji="1" sz="1800" kern="1200">
         <a:solidFill>
           <a:schemeClr val="tx1"/>
         </a:solidFill>
@@ -37,8 +37,8 @@
         <a:cs typeface="+mn-cs"/>
       </a:defRPr>
     </a:lvl2pPr>
-    <a:lvl3pPr marL="914400" algn="l" defTabSz="457200" rtl="0" eaLnBrk="1" latinLnBrk="0" hangingPunct="1">
-      <a:defRPr sz="1800" kern="1200">
+    <a:lvl3pPr marL="914400" algn="l" defTabSz="914400" rtl="0" eaLnBrk="1" latinLnBrk="0" hangingPunct="1">
+      <a:defRPr kumimoji="1" sz="1800" kern="1200">
         <a:solidFill>
           <a:schemeClr val="tx1"/>
         </a:solidFill>
@@ -47,8 +47,8 @@
         <a:cs typeface="+mn-cs"/>
       </a:defRPr>
     </a:lvl3pPr>
-    <a:lvl4pPr marL="1371600" algn="l" defTabSz="457200" rtl="0" eaLnBrk="1" latinLnBrk="0" hangingPunct="1">
-      <a:defRPr sz="1800" kern="1200">
+    <a:lvl4pPr marL="1371600" algn="l" defTabSz="914400" rtl="0" eaLnBrk="1" latinLnBrk="0" hangingPunct="1">
+      <a:defRPr kumimoji="1" sz="1800" kern="1200">
         <a:solidFill>
           <a:schemeClr val="tx1"/>
         </a:solidFill>
@@ -57,8 +57,8 @@
         <a:cs typeface="+mn-cs"/>
       </a:defRPr>
     </a:lvl4pPr>
-    <a:lvl5pPr marL="1828800" algn="l" defTabSz="457200" rtl="0" eaLnBrk="1" latinLnBrk="0" hangingPunct="1">
-      <a:defRPr sz="1800" kern="1200">
+    <a:lvl5pPr marL="1828800" algn="l" defTabSz="914400" rtl="0" eaLnBrk="1" latinLnBrk="0" hangingPunct="1">
+      <a:defRPr kumimoji="1" sz="1800" kern="1200">
         <a:solidFill>
           <a:schemeClr val="tx1"/>
         </a:solidFill>
@@ -67,8 +67,8 @@
         <a:cs typeface="+mn-cs"/>
       </a:defRPr>
     </a:lvl5pPr>
-    <a:lvl6pPr marL="2286000" algn="l" defTabSz="457200" rtl="0" eaLnBrk="1" latinLnBrk="0" hangingPunct="1">
-      <a:defRPr sz="1800" kern="1200">
+    <a:lvl6pPr marL="2286000" algn="l" defTabSz="914400" rtl="0" eaLnBrk="1" latinLnBrk="0" hangingPunct="1">
+      <a:defRPr kumimoji="1" sz="1800" kern="1200">
         <a:solidFill>
           <a:schemeClr val="tx1"/>
         </a:solidFill>
@@ -77,8 +77,8 @@
         <a:cs typeface="+mn-cs"/>
       </a:defRPr>
     </a:lvl6pPr>
-    <a:lvl7pPr marL="2743200" algn="l" defTabSz="457200" rtl="0" eaLnBrk="1" latinLnBrk="0" hangingPunct="1">
-      <a:defRPr sz="1800" kern="1200">
+    <a:lvl7pPr marL="2743200" algn="l" defTabSz="914400" rtl="0" eaLnBrk="1" latinLnBrk="0" hangingPunct="1">
+      <a:defRPr kumimoji="1" sz="1800" kern="1200">
         <a:solidFill>
           <a:schemeClr val="tx1"/>
         </a:solidFill>
@@ -87,8 +87,8 @@
         <a:cs typeface="+mn-cs"/>
       </a:defRPr>
     </a:lvl7pPr>
-    <a:lvl8pPr marL="3200400" algn="l" defTabSz="457200" rtl="0" eaLnBrk="1" latinLnBrk="0" hangingPunct="1">
-      <a:defRPr sz="1800" kern="1200">
+    <a:lvl8pPr marL="3200400" algn="l" defTabSz="914400" rtl="0" eaLnBrk="1" latinLnBrk="0" hangingPunct="1">
+      <a:defRPr kumimoji="1" sz="1800" kern="1200">
         <a:solidFill>
           <a:schemeClr val="tx1"/>
         </a:solidFill>
@@ -97,8 +97,8 @@
         <a:cs typeface="+mn-cs"/>
       </a:defRPr>
     </a:lvl8pPr>
-    <a:lvl9pPr marL="3657600" algn="l" defTabSz="457200" rtl="0" eaLnBrk="1" latinLnBrk="0" hangingPunct="1">
-      <a:defRPr sz="1800" kern="1200">
+    <a:lvl9pPr marL="3657600" algn="l" defTabSz="914400" rtl="0" eaLnBrk="1" latinLnBrk="0" hangingPunct="1">
+      <a:defRPr kumimoji="1" sz="1800" kern="1200">
         <a:solidFill>
           <a:schemeClr val="tx1"/>
         </a:solidFill>
@@ -482,7 +482,7 @@
 
 <file path=ppt/slideLayouts/slideLayout1.xml><?xml version="1.0" encoding="utf-8"?>
 <p:sldLayout xmlns:a="http://schemas.openxmlformats.org/drawingml/2006/main" xmlns:r="http://schemas.openxmlformats.org/officeDocument/2006/relationships" xmlns:p="http://schemas.openxmlformats.org/presentationml/2006/main" type="title" preserve="1">
-  <p:cSld name="Title Slide">
+  <p:cSld name="タイトル スライド">
     <p:spTree>
       <p:nvGrpSpPr>
         <p:cNvPr id="1" name=""/>
@@ -499,7 +499,13 @@
       </p:grpSpPr>
       <p:sp>
         <p:nvSpPr>
-          <p:cNvPr id="2" name="Title 1"/>
+          <p:cNvPr id="2" name="タイトル 1">
+            <a:extLst>
+              <a:ext uri="{FF2B5EF4-FFF2-40B4-BE49-F238E27FC236}">
+                <a16:creationId xmlns:a16="http://schemas.microsoft.com/office/drawing/2014/main" id="{1890F151-2B39-D5FD-24D0-D525D22171F2}"/>
+              </a:ext>
+            </a:extLst>
+          </p:cNvPr>
           <p:cNvSpPr>
             <a:spLocks noGrp="1"/>
           </p:cNvSpPr>
@@ -509,25 +515,34 @@
         </p:nvSpPr>
         <p:spPr>
           <a:xfrm>
-            <a:off x="685800" y="2130425"/>
-            <a:ext cx="7772400" cy="1470025"/>
+            <a:off x="1524000" y="1122363"/>
+            <a:ext cx="9144000" cy="2387600"/>
           </a:xfrm>
         </p:spPr>
         <p:txBody>
-          <a:bodyPr/>
-          <a:lstStyle/>
-          <a:p>
-            <a:r>
-              <a:rPr lang="en-US" smtClean="0"/>
-              <a:t>Click to edit Master title style</a:t>
-            </a:r>
-            <a:endParaRPr lang="en-US"/>
-          </a:p>
-        </p:txBody>
-      </p:sp>
-      <p:sp>
-        <p:nvSpPr>
-          <p:cNvPr id="3" name="Subtitle 2"/>
+          <a:bodyPr anchor="b"/>
+          <a:lstStyle>
+            <a:lvl1pPr algn="ctr">
+              <a:defRPr sz="6000"/>
+            </a:lvl1pPr>
+          </a:lstStyle>
+          <a:p>
+            <a:r>
+              <a:rPr kumimoji="1" lang="ja-JP" altLang="en-US" dirty="0"/>
+              <a:t>マスター タイトルの書式設定</a:t>
+            </a:r>
+          </a:p>
+        </p:txBody>
+      </p:sp>
+      <p:sp>
+        <p:nvSpPr>
+          <p:cNvPr id="3" name="字幕 2">
+            <a:extLst>
+              <a:ext uri="{FF2B5EF4-FFF2-40B4-BE49-F238E27FC236}">
+                <a16:creationId xmlns:a16="http://schemas.microsoft.com/office/drawing/2014/main" id="{1AA2BB15-7034-0B21-0C44-57CEAA63A458}"/>
+              </a:ext>
+            </a:extLst>
+          </p:cNvPr>
           <p:cNvSpPr>
             <a:spLocks noGrp="1"/>
           </p:cNvSpPr>
@@ -537,8 +552,8 @@
         </p:nvSpPr>
         <p:spPr>
           <a:xfrm>
-            <a:off x="1371600" y="3886200"/>
-            <a:ext cx="6400800" cy="1752600"/>
+            <a:off x="1524000" y="3602038"/>
+            <a:ext cx="9144000" cy="1655762"/>
           </a:xfrm>
         </p:spPr>
         <p:txBody>
@@ -546,107 +561,58 @@
           <a:lstStyle>
             <a:lvl1pPr marL="0" indent="0" algn="ctr">
               <a:buNone/>
-              <a:defRPr>
-                <a:solidFill>
-                  <a:schemeClr val="tx1">
-                    <a:tint val="75000"/>
-                  </a:schemeClr>
-                </a:solidFill>
-              </a:defRPr>
+              <a:defRPr sz="2400"/>
             </a:lvl1pPr>
             <a:lvl2pPr marL="457200" indent="0" algn="ctr">
               <a:buNone/>
-              <a:defRPr>
-                <a:solidFill>
-                  <a:schemeClr val="tx1">
-                    <a:tint val="75000"/>
-                  </a:schemeClr>
-                </a:solidFill>
-              </a:defRPr>
+              <a:defRPr sz="2000"/>
             </a:lvl2pPr>
             <a:lvl3pPr marL="914400" indent="0" algn="ctr">
               <a:buNone/>
-              <a:defRPr>
-                <a:solidFill>
-                  <a:schemeClr val="tx1">
-                    <a:tint val="75000"/>
-                  </a:schemeClr>
-                </a:solidFill>
-              </a:defRPr>
+              <a:defRPr sz="1800"/>
             </a:lvl3pPr>
             <a:lvl4pPr marL="1371600" indent="0" algn="ctr">
               <a:buNone/>
-              <a:defRPr>
-                <a:solidFill>
-                  <a:schemeClr val="tx1">
-                    <a:tint val="75000"/>
-                  </a:schemeClr>
-                </a:solidFill>
-              </a:defRPr>
+              <a:defRPr sz="1600"/>
             </a:lvl4pPr>
             <a:lvl5pPr marL="1828800" indent="0" algn="ctr">
               <a:buNone/>
-              <a:defRPr>
-                <a:solidFill>
-                  <a:schemeClr val="tx1">
-                    <a:tint val="75000"/>
-                  </a:schemeClr>
-                </a:solidFill>
-              </a:defRPr>
+              <a:defRPr sz="1600"/>
             </a:lvl5pPr>
             <a:lvl6pPr marL="2286000" indent="0" algn="ctr">
               <a:buNone/>
-              <a:defRPr>
-                <a:solidFill>
-                  <a:schemeClr val="tx1">
-                    <a:tint val="75000"/>
-                  </a:schemeClr>
-                </a:solidFill>
-              </a:defRPr>
+              <a:defRPr sz="1600"/>
             </a:lvl6pPr>
             <a:lvl7pPr marL="2743200" indent="0" algn="ctr">
               <a:buNone/>
-              <a:defRPr>
-                <a:solidFill>
-                  <a:schemeClr val="tx1">
-                    <a:tint val="75000"/>
-                  </a:schemeClr>
-                </a:solidFill>
-              </a:defRPr>
+              <a:defRPr sz="1600"/>
             </a:lvl7pPr>
             <a:lvl8pPr marL="3200400" indent="0" algn="ctr">
               <a:buNone/>
-              <a:defRPr>
-                <a:solidFill>
-                  <a:schemeClr val="tx1">
-                    <a:tint val="75000"/>
-                  </a:schemeClr>
-                </a:solidFill>
-              </a:defRPr>
+              <a:defRPr sz="1600"/>
             </a:lvl8pPr>
             <a:lvl9pPr marL="3657600" indent="0" algn="ctr">
               <a:buNone/>
-              <a:defRPr>
-                <a:solidFill>
-                  <a:schemeClr val="tx1">
-                    <a:tint val="75000"/>
-                  </a:schemeClr>
-                </a:solidFill>
-              </a:defRPr>
+              <a:defRPr sz="1600"/>
             </a:lvl9pPr>
           </a:lstStyle>
           <a:p>
             <a:r>
-              <a:rPr lang="en-US" smtClean="0"/>
-              <a:t>Click to edit Master subtitle style</a:t>
-            </a:r>
-            <a:endParaRPr lang="en-US"/>
-          </a:p>
-        </p:txBody>
-      </p:sp>
-      <p:sp>
-        <p:nvSpPr>
-          <p:cNvPr id="4" name="Date Placeholder 3"/>
+              <a:rPr kumimoji="1" lang="ja-JP" altLang="en-US"/>
+              <a:t>マスター サブタイトルの書式設定</a:t>
+            </a:r>
+          </a:p>
+        </p:txBody>
+      </p:sp>
+      <p:sp>
+        <p:nvSpPr>
+          <p:cNvPr id="4" name="日付プレースホルダー 3">
+            <a:extLst>
+              <a:ext uri="{FF2B5EF4-FFF2-40B4-BE49-F238E27FC236}">
+                <a16:creationId xmlns:a16="http://schemas.microsoft.com/office/drawing/2014/main" id="{A9340E4E-BF7A-5A5E-36E2-8C554038474D}"/>
+              </a:ext>
+            </a:extLst>
+          </p:cNvPr>
           <p:cNvSpPr>
             <a:spLocks noGrp="1"/>
           </p:cNvSpPr>
@@ -659,17 +625,23 @@
           <a:bodyPr/>
           <a:lstStyle/>
           <a:p>
-            <a:fld id="{5BCAD085-E8A6-8845-BD4E-CB4CCA059FC4}" type="datetimeFigureOut">
-              <a:rPr lang="en-US" smtClean="0"/>
-              <a:t>1/27/13</a:t>
+            <a:fld id="{9436AD62-8BED-4F00-BDCC-CEAF4DF844F9}" type="datetimeFigureOut">
+              <a:rPr kumimoji="1" lang="ja-JP" altLang="en-US" smtClean="0"/>
+              <a:t>2025/5/12</a:t>
             </a:fld>
-            <a:endParaRPr lang="en-US"/>
-          </a:p>
-        </p:txBody>
-      </p:sp>
-      <p:sp>
-        <p:nvSpPr>
-          <p:cNvPr id="5" name="Footer Placeholder 4"/>
+            <a:endParaRPr kumimoji="1" lang="ja-JP" altLang="en-US"/>
+          </a:p>
+        </p:txBody>
+      </p:sp>
+      <p:sp>
+        <p:nvSpPr>
+          <p:cNvPr id="5" name="フッター プレースホルダー 4">
+            <a:extLst>
+              <a:ext uri="{FF2B5EF4-FFF2-40B4-BE49-F238E27FC236}">
+                <a16:creationId xmlns:a16="http://schemas.microsoft.com/office/drawing/2014/main" id="{A2969F2B-6B09-1736-2838-F8548DD0658F}"/>
+              </a:ext>
+            </a:extLst>
+          </p:cNvPr>
           <p:cNvSpPr>
             <a:spLocks noGrp="1"/>
           </p:cNvSpPr>
@@ -682,13 +654,19 @@
           <a:bodyPr/>
           <a:lstStyle/>
           <a:p>
-            <a:endParaRPr lang="en-US"/>
-          </a:p>
-        </p:txBody>
-      </p:sp>
-      <p:sp>
-        <p:nvSpPr>
-          <p:cNvPr id="6" name="Slide Number Placeholder 5"/>
+            <a:endParaRPr kumimoji="1" lang="ja-JP" altLang="en-US"/>
+          </a:p>
+        </p:txBody>
+      </p:sp>
+      <p:sp>
+        <p:nvSpPr>
+          <p:cNvPr id="6" name="スライド番号プレースホルダー 5">
+            <a:extLst>
+              <a:ext uri="{FF2B5EF4-FFF2-40B4-BE49-F238E27FC236}">
+                <a16:creationId xmlns:a16="http://schemas.microsoft.com/office/drawing/2014/main" id="{66585CE7-AC35-4151-D8AB-55E6255881B4}"/>
+              </a:ext>
+            </a:extLst>
+          </p:cNvPr>
           <p:cNvSpPr>
             <a:spLocks noGrp="1"/>
           </p:cNvSpPr>
@@ -701,18 +679,18 @@
           <a:bodyPr/>
           <a:lstStyle/>
           <a:p>
-            <a:fld id="{C1FF6DA9-008F-8B48-92A6-B652298478BF}" type="slidenum">
-              <a:rPr lang="en-US" smtClean="0"/>
+            <a:fld id="{9A7F45E2-1352-4454-84E4-E63636FB022F}" type="slidenum">
+              <a:rPr kumimoji="1" lang="ja-JP" altLang="en-US" smtClean="0"/>
               <a:t>‹#›</a:t>
             </a:fld>
-            <a:endParaRPr lang="en-US"/>
+            <a:endParaRPr kumimoji="1" lang="ja-JP" altLang="en-US"/>
           </a:p>
         </p:txBody>
       </p:sp>
     </p:spTree>
     <p:extLst>
       <p:ext uri="{BB962C8B-B14F-4D97-AF65-F5344CB8AC3E}">
-        <p14:creationId xmlns:p14="http://schemas.microsoft.com/office/powerpoint/2010/main" val="3168075583"/>
+        <p14:creationId xmlns:p14="http://schemas.microsoft.com/office/powerpoint/2010/main" val="4005658066"/>
       </p:ext>
     </p:extLst>
   </p:cSld>
@@ -724,7 +702,7 @@
 
 <file path=ppt/slideLayouts/slideLayout10.xml><?xml version="1.0" encoding="utf-8"?>
 <p:sldLayout xmlns:a="http://schemas.openxmlformats.org/drawingml/2006/main" xmlns:r="http://schemas.openxmlformats.org/officeDocument/2006/relationships" xmlns:p="http://schemas.openxmlformats.org/presentationml/2006/main" type="vertTx" preserve="1">
-  <p:cSld name="Title and Vertical Text">
+  <p:cSld name="タイトルと縦書きテキスト">
     <p:spTree>
       <p:nvGrpSpPr>
         <p:cNvPr id="1" name=""/>
@@ -741,7 +719,13 @@
       </p:grpSpPr>
       <p:sp>
         <p:nvSpPr>
-          <p:cNvPr id="2" name="Title 1"/>
+          <p:cNvPr id="2" name="タイトル 1">
+            <a:extLst>
+              <a:ext uri="{FF2B5EF4-FFF2-40B4-BE49-F238E27FC236}">
+                <a16:creationId xmlns:a16="http://schemas.microsoft.com/office/drawing/2014/main" id="{A1FA6141-9EB5-040F-8020-4F1A4F775D2A}"/>
+              </a:ext>
+            </a:extLst>
+          </p:cNvPr>
           <p:cNvSpPr>
             <a:spLocks noGrp="1"/>
           </p:cNvSpPr>
@@ -755,16 +739,21 @@
           <a:lstStyle/>
           <a:p>
             <a:r>
-              <a:rPr lang="en-US" smtClean="0"/>
-              <a:t>Click to edit Master title style</a:t>
-            </a:r>
-            <a:endParaRPr lang="en-US"/>
-          </a:p>
-        </p:txBody>
-      </p:sp>
-      <p:sp>
-        <p:nvSpPr>
-          <p:cNvPr id="3" name="Vertical Text Placeholder 2"/>
+              <a:rPr kumimoji="1" lang="ja-JP" altLang="en-US"/>
+              <a:t>マスター タイトルの書式設定</a:t>
+            </a:r>
+          </a:p>
+        </p:txBody>
+      </p:sp>
+      <p:sp>
+        <p:nvSpPr>
+          <p:cNvPr id="3" name="縦書きテキスト プレースホルダー 2">
+            <a:extLst>
+              <a:ext uri="{FF2B5EF4-FFF2-40B4-BE49-F238E27FC236}">
+                <a16:creationId xmlns:a16="http://schemas.microsoft.com/office/drawing/2014/main" id="{39EF73FA-DD05-338D-225C-446675CBDAF2}"/>
+              </a:ext>
+            </a:extLst>
+          </p:cNvPr>
           <p:cNvSpPr>
             <a:spLocks noGrp="1"/>
           </p:cNvSpPr>
@@ -779,44 +768,81 @@
           <a:p>
             <a:pPr lvl="0"/>
             <a:r>
-              <a:rPr lang="en-US" smtClean="0"/>
-              <a:t>Click to edit Master text styles</a:t>
+              <a:rPr kumimoji="1" lang="ja-JP" altLang="en-US"/>
+              <a:t>マスター テキストの書式設定</a:t>
             </a:r>
           </a:p>
           <a:p>
             <a:pPr lvl="1"/>
             <a:r>
-              <a:rPr lang="en-US" smtClean="0"/>
-              <a:t>Second level</a:t>
+              <a:rPr kumimoji="1" lang="ja-JP" altLang="en-US"/>
+              <a:t>第 </a:t>
+            </a:r>
+            <a:r>
+              <a:rPr kumimoji="1" lang="en-US" altLang="ja-JP"/>
+              <a:t>2 </a:t>
+            </a:r>
+            <a:r>
+              <a:rPr kumimoji="1" lang="ja-JP" altLang="en-US"/>
+              <a:t>レベル</a:t>
             </a:r>
           </a:p>
           <a:p>
             <a:pPr lvl="2"/>
             <a:r>
-              <a:rPr lang="en-US" smtClean="0"/>
-              <a:t>Third level</a:t>
+              <a:rPr kumimoji="1" lang="ja-JP" altLang="en-US"/>
+              <a:t>第 </a:t>
+            </a:r>
+            <a:r>
+              <a:rPr kumimoji="1" lang="en-US" altLang="ja-JP"/>
+              <a:t>3 </a:t>
+            </a:r>
+            <a:r>
+              <a:rPr kumimoji="1" lang="ja-JP" altLang="en-US"/>
+              <a:t>レベル</a:t>
             </a:r>
           </a:p>
           <a:p>
             <a:pPr lvl="3"/>
             <a:r>
-              <a:rPr lang="en-US" smtClean="0"/>
-              <a:t>Fourth level</a:t>
+              <a:rPr kumimoji="1" lang="ja-JP" altLang="en-US"/>
+              <a:t>第 </a:t>
+            </a:r>
+            <a:r>
+              <a:rPr kumimoji="1" lang="en-US" altLang="ja-JP"/>
+              <a:t>4 </a:t>
+            </a:r>
+            <a:r>
+              <a:rPr kumimoji="1" lang="ja-JP" altLang="en-US"/>
+              <a:t>レベル</a:t>
             </a:r>
           </a:p>
           <a:p>
             <a:pPr lvl="4"/>
             <a:r>
-              <a:rPr lang="en-US" smtClean="0"/>
-              <a:t>Fifth level</a:t>
-            </a:r>
-            <a:endParaRPr lang="en-US"/>
-          </a:p>
-        </p:txBody>
-      </p:sp>
-      <p:sp>
-        <p:nvSpPr>
-          <p:cNvPr id="4" name="Date Placeholder 3"/>
+              <a:rPr kumimoji="1" lang="ja-JP" altLang="en-US"/>
+              <a:t>第 </a:t>
+            </a:r>
+            <a:r>
+              <a:rPr kumimoji="1" lang="en-US" altLang="ja-JP"/>
+              <a:t>5 </a:t>
+            </a:r>
+            <a:r>
+              <a:rPr kumimoji="1" lang="ja-JP" altLang="en-US"/>
+              <a:t>レベル</a:t>
+            </a:r>
+          </a:p>
+        </p:txBody>
+      </p:sp>
+      <p:sp>
+        <p:nvSpPr>
+          <p:cNvPr id="4" name="日付プレースホルダー 3">
+            <a:extLst>
+              <a:ext uri="{FF2B5EF4-FFF2-40B4-BE49-F238E27FC236}">
+                <a16:creationId xmlns:a16="http://schemas.microsoft.com/office/drawing/2014/main" id="{0585E1E3-E228-4939-1D94-297DC65878DE}"/>
+              </a:ext>
+            </a:extLst>
+          </p:cNvPr>
           <p:cNvSpPr>
             <a:spLocks noGrp="1"/>
           </p:cNvSpPr>
@@ -829,17 +855,23 @@
           <a:bodyPr/>
           <a:lstStyle/>
           <a:p>
-            <a:fld id="{5BCAD085-E8A6-8845-BD4E-CB4CCA059FC4}" type="datetimeFigureOut">
-              <a:rPr lang="en-US" smtClean="0"/>
-              <a:t>1/27/13</a:t>
+            <a:fld id="{9436AD62-8BED-4F00-BDCC-CEAF4DF844F9}" type="datetimeFigureOut">
+              <a:rPr kumimoji="1" lang="ja-JP" altLang="en-US" smtClean="0"/>
+              <a:t>2025/5/12</a:t>
             </a:fld>
-            <a:endParaRPr lang="en-US"/>
-          </a:p>
-        </p:txBody>
-      </p:sp>
-      <p:sp>
-        <p:nvSpPr>
-          <p:cNvPr id="5" name="Footer Placeholder 4"/>
+            <a:endParaRPr kumimoji="1" lang="ja-JP" altLang="en-US"/>
+          </a:p>
+        </p:txBody>
+      </p:sp>
+      <p:sp>
+        <p:nvSpPr>
+          <p:cNvPr id="5" name="フッター プレースホルダー 4">
+            <a:extLst>
+              <a:ext uri="{FF2B5EF4-FFF2-40B4-BE49-F238E27FC236}">
+                <a16:creationId xmlns:a16="http://schemas.microsoft.com/office/drawing/2014/main" id="{45EE4064-B3E8-55B0-00EB-C071E0EA243B}"/>
+              </a:ext>
+            </a:extLst>
+          </p:cNvPr>
           <p:cNvSpPr>
             <a:spLocks noGrp="1"/>
           </p:cNvSpPr>
@@ -852,13 +884,19 @@
           <a:bodyPr/>
           <a:lstStyle/>
           <a:p>
-            <a:endParaRPr lang="en-US"/>
-          </a:p>
-        </p:txBody>
-      </p:sp>
-      <p:sp>
-        <p:nvSpPr>
-          <p:cNvPr id="6" name="Slide Number Placeholder 5"/>
+            <a:endParaRPr kumimoji="1" lang="ja-JP" altLang="en-US"/>
+          </a:p>
+        </p:txBody>
+      </p:sp>
+      <p:sp>
+        <p:nvSpPr>
+          <p:cNvPr id="6" name="スライド番号プレースホルダー 5">
+            <a:extLst>
+              <a:ext uri="{FF2B5EF4-FFF2-40B4-BE49-F238E27FC236}">
+                <a16:creationId xmlns:a16="http://schemas.microsoft.com/office/drawing/2014/main" id="{B63C5F3E-612D-6A4B-A7C1-C9E20EB7AEE4}"/>
+              </a:ext>
+            </a:extLst>
+          </p:cNvPr>
           <p:cNvSpPr>
             <a:spLocks noGrp="1"/>
           </p:cNvSpPr>
@@ -871,18 +909,18 @@
           <a:bodyPr/>
           <a:lstStyle/>
           <a:p>
-            <a:fld id="{C1FF6DA9-008F-8B48-92A6-B652298478BF}" type="slidenum">
-              <a:rPr lang="en-US" smtClean="0"/>
+            <a:fld id="{9A7F45E2-1352-4454-84E4-E63636FB022F}" type="slidenum">
+              <a:rPr kumimoji="1" lang="ja-JP" altLang="en-US" smtClean="0"/>
               <a:t>‹#›</a:t>
             </a:fld>
-            <a:endParaRPr lang="en-US"/>
+            <a:endParaRPr kumimoji="1" lang="ja-JP" altLang="en-US"/>
           </a:p>
         </p:txBody>
       </p:sp>
     </p:spTree>
     <p:extLst>
       <p:ext uri="{BB962C8B-B14F-4D97-AF65-F5344CB8AC3E}">
-        <p14:creationId xmlns:p14="http://schemas.microsoft.com/office/powerpoint/2010/main" val="2910927964"/>
+        <p14:creationId xmlns:p14="http://schemas.microsoft.com/office/powerpoint/2010/main" val="1804699883"/>
       </p:ext>
     </p:extLst>
   </p:cSld>
@@ -894,7 +932,7 @@
 
 <file path=ppt/slideLayouts/slideLayout11.xml><?xml version="1.0" encoding="utf-8"?>
 <p:sldLayout xmlns:a="http://schemas.openxmlformats.org/drawingml/2006/main" xmlns:r="http://schemas.openxmlformats.org/officeDocument/2006/relationships" xmlns:p="http://schemas.openxmlformats.org/presentationml/2006/main" type="vertTitleAndTx" preserve="1">
-  <p:cSld name="Vertical Title and Text">
+  <p:cSld name="縦書きタイトルと&#10;縦書きテキスト">
     <p:spTree>
       <p:nvGrpSpPr>
         <p:cNvPr id="1" name=""/>
@@ -911,7 +949,13 @@
       </p:grpSpPr>
       <p:sp>
         <p:nvSpPr>
-          <p:cNvPr id="2" name="Vertical Title 1"/>
+          <p:cNvPr id="2" name="縦書きタイトル 1">
+            <a:extLst>
+              <a:ext uri="{FF2B5EF4-FFF2-40B4-BE49-F238E27FC236}">
+                <a16:creationId xmlns:a16="http://schemas.microsoft.com/office/drawing/2014/main" id="{9F132C2F-E241-92D1-BAAD-500B3858A76B}"/>
+              </a:ext>
+            </a:extLst>
+          </p:cNvPr>
           <p:cNvSpPr>
             <a:spLocks noGrp="1"/>
           </p:cNvSpPr>
@@ -921,8 +965,8 @@
         </p:nvSpPr>
         <p:spPr>
           <a:xfrm>
-            <a:off x="6629400" y="274638"/>
-            <a:ext cx="2057400" cy="5851525"/>
+            <a:off x="8724900" y="365125"/>
+            <a:ext cx="2628900" cy="5811838"/>
           </a:xfrm>
         </p:spPr>
         <p:txBody>
@@ -930,16 +974,21 @@
           <a:lstStyle/>
           <a:p>
             <a:r>
-              <a:rPr lang="en-US" smtClean="0"/>
-              <a:t>Click to edit Master title style</a:t>
-            </a:r>
-            <a:endParaRPr lang="en-US"/>
-          </a:p>
-        </p:txBody>
-      </p:sp>
-      <p:sp>
-        <p:nvSpPr>
-          <p:cNvPr id="3" name="Vertical Text Placeholder 2"/>
+              <a:rPr kumimoji="1" lang="ja-JP" altLang="en-US"/>
+              <a:t>マスター タイトルの書式設定</a:t>
+            </a:r>
+          </a:p>
+        </p:txBody>
+      </p:sp>
+      <p:sp>
+        <p:nvSpPr>
+          <p:cNvPr id="3" name="縦書きテキスト プレースホルダー 2">
+            <a:extLst>
+              <a:ext uri="{FF2B5EF4-FFF2-40B4-BE49-F238E27FC236}">
+                <a16:creationId xmlns:a16="http://schemas.microsoft.com/office/drawing/2014/main" id="{566D9693-9C01-66D8-2FB6-C6BA2687053F}"/>
+              </a:ext>
+            </a:extLst>
+          </p:cNvPr>
           <p:cNvSpPr>
             <a:spLocks noGrp="1"/>
           </p:cNvSpPr>
@@ -949,8 +998,8 @@
         </p:nvSpPr>
         <p:spPr>
           <a:xfrm>
-            <a:off x="457200" y="274638"/>
-            <a:ext cx="6019800" cy="5851525"/>
+            <a:off x="838200" y="365125"/>
+            <a:ext cx="7734300" cy="5811838"/>
           </a:xfrm>
         </p:spPr>
         <p:txBody>
@@ -959,44 +1008,81 @@
           <a:p>
             <a:pPr lvl="0"/>
             <a:r>
-              <a:rPr lang="en-US" smtClean="0"/>
-              <a:t>Click to edit Master text styles</a:t>
+              <a:rPr kumimoji="1" lang="ja-JP" altLang="en-US"/>
+              <a:t>マスター テキストの書式設定</a:t>
             </a:r>
           </a:p>
           <a:p>
             <a:pPr lvl="1"/>
             <a:r>
-              <a:rPr lang="en-US" smtClean="0"/>
-              <a:t>Second level</a:t>
+              <a:rPr kumimoji="1" lang="ja-JP" altLang="en-US"/>
+              <a:t>第 </a:t>
+            </a:r>
+            <a:r>
+              <a:rPr kumimoji="1" lang="en-US" altLang="ja-JP"/>
+              <a:t>2 </a:t>
+            </a:r>
+            <a:r>
+              <a:rPr kumimoji="1" lang="ja-JP" altLang="en-US"/>
+              <a:t>レベル</a:t>
             </a:r>
           </a:p>
           <a:p>
             <a:pPr lvl="2"/>
             <a:r>
-              <a:rPr lang="en-US" smtClean="0"/>
-              <a:t>Third level</a:t>
+              <a:rPr kumimoji="1" lang="ja-JP" altLang="en-US"/>
+              <a:t>第 </a:t>
+            </a:r>
+            <a:r>
+              <a:rPr kumimoji="1" lang="en-US" altLang="ja-JP"/>
+              <a:t>3 </a:t>
+            </a:r>
+            <a:r>
+              <a:rPr kumimoji="1" lang="ja-JP" altLang="en-US"/>
+              <a:t>レベル</a:t>
             </a:r>
           </a:p>
           <a:p>
             <a:pPr lvl="3"/>
             <a:r>
-              <a:rPr lang="en-US" smtClean="0"/>
-              <a:t>Fourth level</a:t>
+              <a:rPr kumimoji="1" lang="ja-JP" altLang="en-US"/>
+              <a:t>第 </a:t>
+            </a:r>
+            <a:r>
+              <a:rPr kumimoji="1" lang="en-US" altLang="ja-JP"/>
+              <a:t>4 </a:t>
+            </a:r>
+            <a:r>
+              <a:rPr kumimoji="1" lang="ja-JP" altLang="en-US"/>
+              <a:t>レベル</a:t>
             </a:r>
           </a:p>
           <a:p>
             <a:pPr lvl="4"/>
             <a:r>
-              <a:rPr lang="en-US" smtClean="0"/>
-              <a:t>Fifth level</a:t>
-            </a:r>
-            <a:endParaRPr lang="en-US"/>
-          </a:p>
-        </p:txBody>
-      </p:sp>
-      <p:sp>
-        <p:nvSpPr>
-          <p:cNvPr id="4" name="Date Placeholder 3"/>
+              <a:rPr kumimoji="1" lang="ja-JP" altLang="en-US"/>
+              <a:t>第 </a:t>
+            </a:r>
+            <a:r>
+              <a:rPr kumimoji="1" lang="en-US" altLang="ja-JP"/>
+              <a:t>5 </a:t>
+            </a:r>
+            <a:r>
+              <a:rPr kumimoji="1" lang="ja-JP" altLang="en-US"/>
+              <a:t>レベル</a:t>
+            </a:r>
+          </a:p>
+        </p:txBody>
+      </p:sp>
+      <p:sp>
+        <p:nvSpPr>
+          <p:cNvPr id="4" name="日付プレースホルダー 3">
+            <a:extLst>
+              <a:ext uri="{FF2B5EF4-FFF2-40B4-BE49-F238E27FC236}">
+                <a16:creationId xmlns:a16="http://schemas.microsoft.com/office/drawing/2014/main" id="{EDFE14A2-B2AE-BBB6-A6AE-4EC54A99F2B6}"/>
+              </a:ext>
+            </a:extLst>
+          </p:cNvPr>
           <p:cNvSpPr>
             <a:spLocks noGrp="1"/>
           </p:cNvSpPr>
@@ -1009,17 +1095,23 @@
           <a:bodyPr/>
           <a:lstStyle/>
           <a:p>
-            <a:fld id="{5BCAD085-E8A6-8845-BD4E-CB4CCA059FC4}" type="datetimeFigureOut">
-              <a:rPr lang="en-US" smtClean="0"/>
-              <a:t>1/27/13</a:t>
+            <a:fld id="{9436AD62-8BED-4F00-BDCC-CEAF4DF844F9}" type="datetimeFigureOut">
+              <a:rPr kumimoji="1" lang="ja-JP" altLang="en-US" smtClean="0"/>
+              <a:t>2025/5/12</a:t>
             </a:fld>
-            <a:endParaRPr lang="en-US"/>
-          </a:p>
-        </p:txBody>
-      </p:sp>
-      <p:sp>
-        <p:nvSpPr>
-          <p:cNvPr id="5" name="Footer Placeholder 4"/>
+            <a:endParaRPr kumimoji="1" lang="ja-JP" altLang="en-US"/>
+          </a:p>
+        </p:txBody>
+      </p:sp>
+      <p:sp>
+        <p:nvSpPr>
+          <p:cNvPr id="5" name="フッター プレースホルダー 4">
+            <a:extLst>
+              <a:ext uri="{FF2B5EF4-FFF2-40B4-BE49-F238E27FC236}">
+                <a16:creationId xmlns:a16="http://schemas.microsoft.com/office/drawing/2014/main" id="{F67B3902-EA03-2410-24BB-837AE3FD0191}"/>
+              </a:ext>
+            </a:extLst>
+          </p:cNvPr>
           <p:cNvSpPr>
             <a:spLocks noGrp="1"/>
           </p:cNvSpPr>
@@ -1032,13 +1124,19 @@
           <a:bodyPr/>
           <a:lstStyle/>
           <a:p>
-            <a:endParaRPr lang="en-US"/>
-          </a:p>
-        </p:txBody>
-      </p:sp>
-      <p:sp>
-        <p:nvSpPr>
-          <p:cNvPr id="6" name="Slide Number Placeholder 5"/>
+            <a:endParaRPr kumimoji="1" lang="ja-JP" altLang="en-US"/>
+          </a:p>
+        </p:txBody>
+      </p:sp>
+      <p:sp>
+        <p:nvSpPr>
+          <p:cNvPr id="6" name="スライド番号プレースホルダー 5">
+            <a:extLst>
+              <a:ext uri="{FF2B5EF4-FFF2-40B4-BE49-F238E27FC236}">
+                <a16:creationId xmlns:a16="http://schemas.microsoft.com/office/drawing/2014/main" id="{E0BB3DCB-3B34-797F-D039-A737455324C0}"/>
+              </a:ext>
+            </a:extLst>
+          </p:cNvPr>
           <p:cNvSpPr>
             <a:spLocks noGrp="1"/>
           </p:cNvSpPr>
@@ -1051,18 +1149,18 @@
           <a:bodyPr/>
           <a:lstStyle/>
           <a:p>
-            <a:fld id="{C1FF6DA9-008F-8B48-92A6-B652298478BF}" type="slidenum">
-              <a:rPr lang="en-US" smtClean="0"/>
+            <a:fld id="{9A7F45E2-1352-4454-84E4-E63636FB022F}" type="slidenum">
+              <a:rPr kumimoji="1" lang="ja-JP" altLang="en-US" smtClean="0"/>
               <a:t>‹#›</a:t>
             </a:fld>
-            <a:endParaRPr lang="en-US"/>
+            <a:endParaRPr kumimoji="1" lang="ja-JP" altLang="en-US"/>
           </a:p>
         </p:txBody>
       </p:sp>
     </p:spTree>
     <p:extLst>
       <p:ext uri="{BB962C8B-B14F-4D97-AF65-F5344CB8AC3E}">
-        <p14:creationId xmlns:p14="http://schemas.microsoft.com/office/powerpoint/2010/main" val="3612223792"/>
+        <p14:creationId xmlns:p14="http://schemas.microsoft.com/office/powerpoint/2010/main" val="596631167"/>
       </p:ext>
     </p:extLst>
   </p:cSld>
@@ -1074,7 +1172,7 @@
 
 <file path=ppt/slideLayouts/slideLayout2.xml><?xml version="1.0" encoding="utf-8"?>
 <p:sldLayout xmlns:a="http://schemas.openxmlformats.org/drawingml/2006/main" xmlns:r="http://schemas.openxmlformats.org/officeDocument/2006/relationships" xmlns:p="http://schemas.openxmlformats.org/presentationml/2006/main" type="obj" preserve="1">
-  <p:cSld name="Title and Content">
+  <p:cSld name="タイトルとコンテンツ">
     <p:spTree>
       <p:nvGrpSpPr>
         <p:cNvPr id="1" name=""/>
@@ -1091,7 +1189,13 @@
       </p:grpSpPr>
       <p:sp>
         <p:nvSpPr>
-          <p:cNvPr id="2" name="Title 1"/>
+          <p:cNvPr id="2" name="タイトル 1">
+            <a:extLst>
+              <a:ext uri="{FF2B5EF4-FFF2-40B4-BE49-F238E27FC236}">
+                <a16:creationId xmlns:a16="http://schemas.microsoft.com/office/drawing/2014/main" id="{7276B1CE-9E61-2056-2477-67C02CAE1965}"/>
+              </a:ext>
+            </a:extLst>
+          </p:cNvPr>
           <p:cNvSpPr>
             <a:spLocks noGrp="1"/>
           </p:cNvSpPr>
@@ -1105,16 +1209,21 @@
           <a:lstStyle/>
           <a:p>
             <a:r>
-              <a:rPr lang="en-US" smtClean="0"/>
-              <a:t>Click to edit Master title style</a:t>
-            </a:r>
-            <a:endParaRPr lang="en-US"/>
-          </a:p>
-        </p:txBody>
-      </p:sp>
-      <p:sp>
-        <p:nvSpPr>
-          <p:cNvPr id="3" name="Content Placeholder 2"/>
+              <a:rPr kumimoji="1" lang="ja-JP" altLang="en-US"/>
+              <a:t>マスター タイトルの書式設定</a:t>
+            </a:r>
+          </a:p>
+        </p:txBody>
+      </p:sp>
+      <p:sp>
+        <p:nvSpPr>
+          <p:cNvPr id="3" name="コンテンツ プレースホルダー 2">
+            <a:extLst>
+              <a:ext uri="{FF2B5EF4-FFF2-40B4-BE49-F238E27FC236}">
+                <a16:creationId xmlns:a16="http://schemas.microsoft.com/office/drawing/2014/main" id="{33FD55B2-CCF0-D923-DF2B-059775EB3941}"/>
+              </a:ext>
+            </a:extLst>
+          </p:cNvPr>
           <p:cNvSpPr>
             <a:spLocks noGrp="1"/>
           </p:cNvSpPr>
@@ -1129,44 +1238,81 @@
           <a:p>
             <a:pPr lvl="0"/>
             <a:r>
-              <a:rPr lang="en-US" smtClean="0"/>
-              <a:t>Click to edit Master text styles</a:t>
+              <a:rPr kumimoji="1" lang="ja-JP" altLang="en-US"/>
+              <a:t>マスター テキストの書式設定</a:t>
             </a:r>
           </a:p>
           <a:p>
             <a:pPr lvl="1"/>
             <a:r>
-              <a:rPr lang="en-US" smtClean="0"/>
-              <a:t>Second level</a:t>
+              <a:rPr kumimoji="1" lang="ja-JP" altLang="en-US"/>
+              <a:t>第 </a:t>
+            </a:r>
+            <a:r>
+              <a:rPr kumimoji="1" lang="en-US" altLang="ja-JP"/>
+              <a:t>2 </a:t>
+            </a:r>
+            <a:r>
+              <a:rPr kumimoji="1" lang="ja-JP" altLang="en-US"/>
+              <a:t>レベル</a:t>
             </a:r>
           </a:p>
           <a:p>
             <a:pPr lvl="2"/>
             <a:r>
-              <a:rPr lang="en-US" smtClean="0"/>
-              <a:t>Third level</a:t>
+              <a:rPr kumimoji="1" lang="ja-JP" altLang="en-US"/>
+              <a:t>第 </a:t>
+            </a:r>
+            <a:r>
+              <a:rPr kumimoji="1" lang="en-US" altLang="ja-JP"/>
+              <a:t>3 </a:t>
+            </a:r>
+            <a:r>
+              <a:rPr kumimoji="1" lang="ja-JP" altLang="en-US"/>
+              <a:t>レベル</a:t>
             </a:r>
           </a:p>
           <a:p>
             <a:pPr lvl="3"/>
             <a:r>
-              <a:rPr lang="en-US" smtClean="0"/>
-              <a:t>Fourth level</a:t>
+              <a:rPr kumimoji="1" lang="ja-JP" altLang="en-US"/>
+              <a:t>第 </a:t>
+            </a:r>
+            <a:r>
+              <a:rPr kumimoji="1" lang="en-US" altLang="ja-JP"/>
+              <a:t>4 </a:t>
+            </a:r>
+            <a:r>
+              <a:rPr kumimoji="1" lang="ja-JP" altLang="en-US"/>
+              <a:t>レベル</a:t>
             </a:r>
           </a:p>
           <a:p>
             <a:pPr lvl="4"/>
             <a:r>
-              <a:rPr lang="en-US" smtClean="0"/>
-              <a:t>Fifth level</a:t>
-            </a:r>
-            <a:endParaRPr lang="en-US"/>
-          </a:p>
-        </p:txBody>
-      </p:sp>
-      <p:sp>
-        <p:nvSpPr>
-          <p:cNvPr id="4" name="Date Placeholder 3"/>
+              <a:rPr kumimoji="1" lang="ja-JP" altLang="en-US"/>
+              <a:t>第 </a:t>
+            </a:r>
+            <a:r>
+              <a:rPr kumimoji="1" lang="en-US" altLang="ja-JP"/>
+              <a:t>5 </a:t>
+            </a:r>
+            <a:r>
+              <a:rPr kumimoji="1" lang="ja-JP" altLang="en-US"/>
+              <a:t>レベル</a:t>
+            </a:r>
+          </a:p>
+        </p:txBody>
+      </p:sp>
+      <p:sp>
+        <p:nvSpPr>
+          <p:cNvPr id="4" name="日付プレースホルダー 3">
+            <a:extLst>
+              <a:ext uri="{FF2B5EF4-FFF2-40B4-BE49-F238E27FC236}">
+                <a16:creationId xmlns:a16="http://schemas.microsoft.com/office/drawing/2014/main" id="{3FC31E08-AB81-2A62-DC63-7BF388C1E2C0}"/>
+              </a:ext>
+            </a:extLst>
+          </p:cNvPr>
           <p:cNvSpPr>
             <a:spLocks noGrp="1"/>
           </p:cNvSpPr>
@@ -1179,17 +1325,23 @@
           <a:bodyPr/>
           <a:lstStyle/>
           <a:p>
-            <a:fld id="{5BCAD085-E8A6-8845-BD4E-CB4CCA059FC4}" type="datetimeFigureOut">
-              <a:rPr lang="en-US" smtClean="0"/>
-              <a:t>1/27/13</a:t>
+            <a:fld id="{9436AD62-8BED-4F00-BDCC-CEAF4DF844F9}" type="datetimeFigureOut">
+              <a:rPr kumimoji="1" lang="ja-JP" altLang="en-US" smtClean="0"/>
+              <a:t>2025/5/12</a:t>
             </a:fld>
-            <a:endParaRPr lang="en-US"/>
-          </a:p>
-        </p:txBody>
-      </p:sp>
-      <p:sp>
-        <p:nvSpPr>
-          <p:cNvPr id="5" name="Footer Placeholder 4"/>
+            <a:endParaRPr kumimoji="1" lang="ja-JP" altLang="en-US"/>
+          </a:p>
+        </p:txBody>
+      </p:sp>
+      <p:sp>
+        <p:nvSpPr>
+          <p:cNvPr id="5" name="フッター プレースホルダー 4">
+            <a:extLst>
+              <a:ext uri="{FF2B5EF4-FFF2-40B4-BE49-F238E27FC236}">
+                <a16:creationId xmlns:a16="http://schemas.microsoft.com/office/drawing/2014/main" id="{B08468F4-F398-710C-9D51-3088CBA528FE}"/>
+              </a:ext>
+            </a:extLst>
+          </p:cNvPr>
           <p:cNvSpPr>
             <a:spLocks noGrp="1"/>
           </p:cNvSpPr>
@@ -1202,13 +1354,19 @@
           <a:bodyPr/>
           <a:lstStyle/>
           <a:p>
-            <a:endParaRPr lang="en-US"/>
-          </a:p>
-        </p:txBody>
-      </p:sp>
-      <p:sp>
-        <p:nvSpPr>
-          <p:cNvPr id="6" name="Slide Number Placeholder 5"/>
+            <a:endParaRPr kumimoji="1" lang="ja-JP" altLang="en-US"/>
+          </a:p>
+        </p:txBody>
+      </p:sp>
+      <p:sp>
+        <p:nvSpPr>
+          <p:cNvPr id="6" name="スライド番号プレースホルダー 5">
+            <a:extLst>
+              <a:ext uri="{FF2B5EF4-FFF2-40B4-BE49-F238E27FC236}">
+                <a16:creationId xmlns:a16="http://schemas.microsoft.com/office/drawing/2014/main" id="{1B8AC16A-8C0C-AA3B-4F96-46254AD94772}"/>
+              </a:ext>
+            </a:extLst>
+          </p:cNvPr>
           <p:cNvSpPr>
             <a:spLocks noGrp="1"/>
           </p:cNvSpPr>
@@ -1221,18 +1379,18 @@
           <a:bodyPr/>
           <a:lstStyle/>
           <a:p>
-            <a:fld id="{C1FF6DA9-008F-8B48-92A6-B652298478BF}" type="slidenum">
-              <a:rPr lang="en-US" smtClean="0"/>
+            <a:fld id="{9A7F45E2-1352-4454-84E4-E63636FB022F}" type="slidenum">
+              <a:rPr kumimoji="1" lang="ja-JP" altLang="en-US" smtClean="0"/>
               <a:t>‹#›</a:t>
             </a:fld>
-            <a:endParaRPr lang="en-US"/>
+            <a:endParaRPr kumimoji="1" lang="ja-JP" altLang="en-US"/>
           </a:p>
         </p:txBody>
       </p:sp>
     </p:spTree>
     <p:extLst>
       <p:ext uri="{BB962C8B-B14F-4D97-AF65-F5344CB8AC3E}">
-        <p14:creationId xmlns:p14="http://schemas.microsoft.com/office/powerpoint/2010/main" val="2614314258"/>
+        <p14:creationId xmlns:p14="http://schemas.microsoft.com/office/powerpoint/2010/main" val="3319129114"/>
       </p:ext>
     </p:extLst>
   </p:cSld>
@@ -1244,7 +1402,7 @@
 
 <file path=ppt/slideLayouts/slideLayout3.xml><?xml version="1.0" encoding="utf-8"?>
 <p:sldLayout xmlns:a="http://schemas.openxmlformats.org/drawingml/2006/main" xmlns:r="http://schemas.openxmlformats.org/officeDocument/2006/relationships" xmlns:p="http://schemas.openxmlformats.org/presentationml/2006/main" type="secHead" preserve="1">
-  <p:cSld name="Section Header">
+  <p:cSld name="セクション見出し">
     <p:spTree>
       <p:nvGrpSpPr>
         <p:cNvPr id="1" name=""/>
@@ -1261,7 +1419,13 @@
       </p:grpSpPr>
       <p:sp>
         <p:nvSpPr>
-          <p:cNvPr id="2" name="Title 1"/>
+          <p:cNvPr id="2" name="タイトル 1">
+            <a:extLst>
+              <a:ext uri="{FF2B5EF4-FFF2-40B4-BE49-F238E27FC236}">
+                <a16:creationId xmlns:a16="http://schemas.microsoft.com/office/drawing/2014/main" id="{4349B001-4BBF-A672-5F15-CCBB6151F74C}"/>
+              </a:ext>
+            </a:extLst>
+          </p:cNvPr>
           <p:cNvSpPr>
             <a:spLocks noGrp="1"/>
           </p:cNvSpPr>
@@ -1271,29 +1435,34 @@
         </p:nvSpPr>
         <p:spPr>
           <a:xfrm>
-            <a:off x="722313" y="4406900"/>
-            <a:ext cx="7772400" cy="1362075"/>
+            <a:off x="831850" y="1709738"/>
+            <a:ext cx="10515600" cy="2852737"/>
           </a:xfrm>
         </p:spPr>
         <p:txBody>
-          <a:bodyPr anchor="t"/>
+          <a:bodyPr anchor="b"/>
           <a:lstStyle>
-            <a:lvl1pPr algn="l">
-              <a:defRPr sz="4000" b="1" cap="all"/>
+            <a:lvl1pPr>
+              <a:defRPr sz="6000"/>
             </a:lvl1pPr>
           </a:lstStyle>
           <a:p>
             <a:r>
-              <a:rPr lang="en-US" smtClean="0"/>
-              <a:t>Click to edit Master title style</a:t>
-            </a:r>
-            <a:endParaRPr lang="en-US"/>
-          </a:p>
-        </p:txBody>
-      </p:sp>
-      <p:sp>
-        <p:nvSpPr>
-          <p:cNvPr id="3" name="Text Placeholder 2"/>
+              <a:rPr kumimoji="1" lang="ja-JP" altLang="en-US"/>
+              <a:t>マスター タイトルの書式設定</a:t>
+            </a:r>
+          </a:p>
+        </p:txBody>
+      </p:sp>
+      <p:sp>
+        <p:nvSpPr>
+          <p:cNvPr id="3" name="テキスト プレースホルダー 2">
+            <a:extLst>
+              <a:ext uri="{FF2B5EF4-FFF2-40B4-BE49-F238E27FC236}">
+                <a16:creationId xmlns:a16="http://schemas.microsoft.com/office/drawing/2014/main" id="{88191BC1-5BBC-4A26-E175-79B073217DA0}"/>
+              </a:ext>
+            </a:extLst>
+          </p:cNvPr>
           <p:cNvSpPr>
             <a:spLocks noGrp="1"/>
           </p:cNvSpPr>
@@ -1303,99 +1472,99 @@
         </p:nvSpPr>
         <p:spPr>
           <a:xfrm>
-            <a:off x="722313" y="2906713"/>
-            <a:ext cx="7772400" cy="1500187"/>
+            <a:off x="831850" y="4589463"/>
+            <a:ext cx="10515600" cy="1500187"/>
           </a:xfrm>
         </p:spPr>
         <p:txBody>
-          <a:bodyPr anchor="b"/>
+          <a:bodyPr/>
           <a:lstStyle>
             <a:lvl1pPr marL="0" indent="0">
               <a:buNone/>
-              <a:defRPr sz="2000">
+              <a:defRPr sz="2400">
                 <a:solidFill>
                   <a:schemeClr val="tx1">
-                    <a:tint val="75000"/>
+                    <a:tint val="82000"/>
                   </a:schemeClr>
                 </a:solidFill>
               </a:defRPr>
             </a:lvl1pPr>
             <a:lvl2pPr marL="457200" indent="0">
               <a:buNone/>
-              <a:defRPr sz="1800">
+              <a:defRPr sz="2000">
                 <a:solidFill>
                   <a:schemeClr val="tx1">
-                    <a:tint val="75000"/>
+                    <a:tint val="82000"/>
                   </a:schemeClr>
                 </a:solidFill>
               </a:defRPr>
             </a:lvl2pPr>
             <a:lvl3pPr marL="914400" indent="0">
               <a:buNone/>
-              <a:defRPr sz="1600">
+              <a:defRPr sz="1800">
                 <a:solidFill>
                   <a:schemeClr val="tx1">
-                    <a:tint val="75000"/>
+                    <a:tint val="82000"/>
                   </a:schemeClr>
                 </a:solidFill>
               </a:defRPr>
             </a:lvl3pPr>
             <a:lvl4pPr marL="1371600" indent="0">
               <a:buNone/>
-              <a:defRPr sz="1400">
+              <a:defRPr sz="1600">
                 <a:solidFill>
                   <a:schemeClr val="tx1">
-                    <a:tint val="75000"/>
+                    <a:tint val="82000"/>
                   </a:schemeClr>
                 </a:solidFill>
               </a:defRPr>
             </a:lvl4pPr>
             <a:lvl5pPr marL="1828800" indent="0">
               <a:buNone/>
-              <a:defRPr sz="1400">
+              <a:defRPr sz="1600">
                 <a:solidFill>
                   <a:schemeClr val="tx1">
-                    <a:tint val="75000"/>
+                    <a:tint val="82000"/>
                   </a:schemeClr>
                 </a:solidFill>
               </a:defRPr>
             </a:lvl5pPr>
             <a:lvl6pPr marL="2286000" indent="0">
               <a:buNone/>
-              <a:defRPr sz="1400">
+              <a:defRPr sz="1600">
                 <a:solidFill>
                   <a:schemeClr val="tx1">
-                    <a:tint val="75000"/>
+                    <a:tint val="82000"/>
                   </a:schemeClr>
                 </a:solidFill>
               </a:defRPr>
             </a:lvl6pPr>
             <a:lvl7pPr marL="2743200" indent="0">
               <a:buNone/>
-              <a:defRPr sz="1400">
+              <a:defRPr sz="1600">
                 <a:solidFill>
                   <a:schemeClr val="tx1">
-                    <a:tint val="75000"/>
+                    <a:tint val="82000"/>
                   </a:schemeClr>
                 </a:solidFill>
               </a:defRPr>
             </a:lvl7pPr>
             <a:lvl8pPr marL="3200400" indent="0">
               <a:buNone/>
-              <a:defRPr sz="1400">
+              <a:defRPr sz="1600">
                 <a:solidFill>
                   <a:schemeClr val="tx1">
-                    <a:tint val="75000"/>
+                    <a:tint val="82000"/>
                   </a:schemeClr>
                 </a:solidFill>
               </a:defRPr>
             </a:lvl8pPr>
             <a:lvl9pPr marL="3657600" indent="0">
               <a:buNone/>
-              <a:defRPr sz="1400">
+              <a:defRPr sz="1600">
                 <a:solidFill>
                   <a:schemeClr val="tx1">
-                    <a:tint val="75000"/>
+                    <a:tint val="82000"/>
                   </a:schemeClr>
                 </a:solidFill>
               </a:defRPr>
@@ -1404,15 +1573,21 @@
           <a:p>
             <a:pPr lvl="0"/>
             <a:r>
-              <a:rPr lang="en-US" smtClean="0"/>
-              <a:t>Click to edit Master text styles</a:t>
-            </a:r>
-          </a:p>
-        </p:txBody>
-      </p:sp>
-      <p:sp>
-        <p:nvSpPr>
-          <p:cNvPr id="4" name="Date Placeholder 3"/>
+              <a:rPr kumimoji="1" lang="ja-JP" altLang="en-US"/>
+              <a:t>マスター テキストの書式設定</a:t>
+            </a:r>
+          </a:p>
+        </p:txBody>
+      </p:sp>
+      <p:sp>
+        <p:nvSpPr>
+          <p:cNvPr id="4" name="日付プレースホルダー 3">
+            <a:extLst>
+              <a:ext uri="{FF2B5EF4-FFF2-40B4-BE49-F238E27FC236}">
+                <a16:creationId xmlns:a16="http://schemas.microsoft.com/office/drawing/2014/main" id="{C21A7DF3-AFC3-5284-187F-1A3CA6BFBEC2}"/>
+              </a:ext>
+            </a:extLst>
+          </p:cNvPr>
           <p:cNvSpPr>
             <a:spLocks noGrp="1"/>
           </p:cNvSpPr>
@@ -1425,17 +1600,23 @@
           <a:bodyPr/>
           <a:lstStyle/>
           <a:p>
-            <a:fld id="{5BCAD085-E8A6-8845-BD4E-CB4CCA059FC4}" type="datetimeFigureOut">
-              <a:rPr lang="en-US" smtClean="0"/>
-              <a:t>1/27/13</a:t>
+            <a:fld id="{9436AD62-8BED-4F00-BDCC-CEAF4DF844F9}" type="datetimeFigureOut">
+              <a:rPr kumimoji="1" lang="ja-JP" altLang="en-US" smtClean="0"/>
+              <a:t>2025/5/12</a:t>
             </a:fld>
-            <a:endParaRPr lang="en-US"/>
-          </a:p>
-        </p:txBody>
-      </p:sp>
-      <p:sp>
-        <p:nvSpPr>
-          <p:cNvPr id="5" name="Footer Placeholder 4"/>
+            <a:endParaRPr kumimoji="1" lang="ja-JP" altLang="en-US"/>
+          </a:p>
+        </p:txBody>
+      </p:sp>
+      <p:sp>
+        <p:nvSpPr>
+          <p:cNvPr id="5" name="フッター プレースホルダー 4">
+            <a:extLst>
+              <a:ext uri="{FF2B5EF4-FFF2-40B4-BE49-F238E27FC236}">
+                <a16:creationId xmlns:a16="http://schemas.microsoft.com/office/drawing/2014/main" id="{F3D51430-B2F6-73C1-C707-A31FA05BBCB5}"/>
+              </a:ext>
+            </a:extLst>
+          </p:cNvPr>
           <p:cNvSpPr>
             <a:spLocks noGrp="1"/>
           </p:cNvSpPr>
@@ -1448,13 +1629,19 @@
           <a:bodyPr/>
           <a:lstStyle/>
           <a:p>
-            <a:endParaRPr lang="en-US"/>
-          </a:p>
-        </p:txBody>
-      </p:sp>
-      <p:sp>
-        <p:nvSpPr>
-          <p:cNvPr id="6" name="Slide Number Placeholder 5"/>
+            <a:endParaRPr kumimoji="1" lang="ja-JP" altLang="en-US"/>
+          </a:p>
+        </p:txBody>
+      </p:sp>
+      <p:sp>
+        <p:nvSpPr>
+          <p:cNvPr id="6" name="スライド番号プレースホルダー 5">
+            <a:extLst>
+              <a:ext uri="{FF2B5EF4-FFF2-40B4-BE49-F238E27FC236}">
+                <a16:creationId xmlns:a16="http://schemas.microsoft.com/office/drawing/2014/main" id="{682960FA-C7A2-2632-BB74-246DF3B0250B}"/>
+              </a:ext>
+            </a:extLst>
+          </p:cNvPr>
           <p:cNvSpPr>
             <a:spLocks noGrp="1"/>
           </p:cNvSpPr>
@@ -1467,18 +1654,18 @@
           <a:bodyPr/>
           <a:lstStyle/>
           <a:p>
-            <a:fld id="{C1FF6DA9-008F-8B48-92A6-B652298478BF}" type="slidenum">
-              <a:rPr lang="en-US" smtClean="0"/>
+            <a:fld id="{9A7F45E2-1352-4454-84E4-E63636FB022F}" type="slidenum">
+              <a:rPr kumimoji="1" lang="ja-JP" altLang="en-US" smtClean="0"/>
               <a:t>‹#›</a:t>
             </a:fld>
-            <a:endParaRPr lang="en-US"/>
+            <a:endParaRPr kumimoji="1" lang="ja-JP" altLang="en-US"/>
           </a:p>
         </p:txBody>
       </p:sp>
     </p:spTree>
     <p:extLst>
       <p:ext uri="{BB962C8B-B14F-4D97-AF65-F5344CB8AC3E}">
-        <p14:creationId xmlns:p14="http://schemas.microsoft.com/office/powerpoint/2010/main" val="960648375"/>
+        <p14:creationId xmlns:p14="http://schemas.microsoft.com/office/powerpoint/2010/main" val="3319029222"/>
       </p:ext>
     </p:extLst>
   </p:cSld>
@@ -1490,7 +1677,7 @@
 
 <file path=ppt/slideLayouts/slideLayout4.xml><?xml version="1.0" encoding="utf-8"?>
 <p:sldLayout xmlns:a="http://schemas.openxmlformats.org/drawingml/2006/main" xmlns:r="http://schemas.openxmlformats.org/officeDocument/2006/relationships" xmlns:p="http://schemas.openxmlformats.org/presentationml/2006/main" type="twoObj" preserve="1">
-  <p:cSld name="Two Content">
+  <p:cSld name="2 つのコンテンツ">
     <p:spTree>
       <p:nvGrpSpPr>
         <p:cNvPr id="1" name=""/>
@@ -1507,7 +1694,13 @@
       </p:grpSpPr>
       <p:sp>
         <p:nvSpPr>
-          <p:cNvPr id="2" name="Title 1"/>
+          <p:cNvPr id="2" name="タイトル 1">
+            <a:extLst>
+              <a:ext uri="{FF2B5EF4-FFF2-40B4-BE49-F238E27FC236}">
+                <a16:creationId xmlns:a16="http://schemas.microsoft.com/office/drawing/2014/main" id="{CA7FD804-76A0-B2F9-88B3-08CE2EB899C7}"/>
+              </a:ext>
+            </a:extLst>
+          </p:cNvPr>
           <p:cNvSpPr>
             <a:spLocks noGrp="1"/>
           </p:cNvSpPr>
@@ -1521,16 +1714,21 @@
           <a:lstStyle/>
           <a:p>
             <a:r>
-              <a:rPr lang="en-US" smtClean="0"/>
-              <a:t>Click to edit Master title style</a:t>
-            </a:r>
-            <a:endParaRPr lang="en-US"/>
-          </a:p>
-        </p:txBody>
-      </p:sp>
-      <p:sp>
-        <p:nvSpPr>
-          <p:cNvPr id="3" name="Content Placeholder 2"/>
+              <a:rPr kumimoji="1" lang="ja-JP" altLang="en-US"/>
+              <a:t>マスター タイトルの書式設定</a:t>
+            </a:r>
+          </a:p>
+        </p:txBody>
+      </p:sp>
+      <p:sp>
+        <p:nvSpPr>
+          <p:cNvPr id="3" name="コンテンツ プレースホルダー 2">
+            <a:extLst>
+              <a:ext uri="{FF2B5EF4-FFF2-40B4-BE49-F238E27FC236}">
+                <a16:creationId xmlns:a16="http://schemas.microsoft.com/office/drawing/2014/main" id="{ED4B3EC3-5274-833B-9053-BC1157BE727A}"/>
+              </a:ext>
+            </a:extLst>
+          </p:cNvPr>
           <p:cNvSpPr>
             <a:spLocks noGrp="1"/>
           </p:cNvSpPr>
@@ -1540,82 +1738,91 @@
         </p:nvSpPr>
         <p:spPr>
           <a:xfrm>
-            <a:off x="457200" y="1600200"/>
-            <a:ext cx="4038600" cy="4525963"/>
+            <a:off x="838200" y="1825625"/>
+            <a:ext cx="5181600" cy="4351338"/>
           </a:xfrm>
         </p:spPr>
         <p:txBody>
           <a:bodyPr/>
-          <a:lstStyle>
-            <a:lvl1pPr>
-              <a:defRPr sz="2800"/>
-            </a:lvl1pPr>
-            <a:lvl2pPr>
-              <a:defRPr sz="2400"/>
-            </a:lvl2pPr>
-            <a:lvl3pPr>
-              <a:defRPr sz="2000"/>
-            </a:lvl3pPr>
-            <a:lvl4pPr>
-              <a:defRPr sz="1800"/>
-            </a:lvl4pPr>
-            <a:lvl5pPr>
-              <a:defRPr sz="1800"/>
-            </a:lvl5pPr>
-            <a:lvl6pPr>
-              <a:defRPr sz="1800"/>
-            </a:lvl6pPr>
-            <a:lvl7pPr>
-              <a:defRPr sz="1800"/>
-            </a:lvl7pPr>
-            <a:lvl8pPr>
-              <a:defRPr sz="1800"/>
-            </a:lvl8pPr>
-            <a:lvl9pPr>
-              <a:defRPr sz="1800"/>
-            </a:lvl9pPr>
-          </a:lstStyle>
+          <a:lstStyle/>
           <a:p>
             <a:pPr lvl="0"/>
             <a:r>
-              <a:rPr lang="en-US" smtClean="0"/>
-              <a:t>Click to edit Master text styles</a:t>
+              <a:rPr kumimoji="1" lang="ja-JP" altLang="en-US"/>
+              <a:t>マスター テキストの書式設定</a:t>
             </a:r>
           </a:p>
           <a:p>
             <a:pPr lvl="1"/>
             <a:r>
-              <a:rPr lang="en-US" smtClean="0"/>
-              <a:t>Second level</a:t>
+              <a:rPr kumimoji="1" lang="ja-JP" altLang="en-US"/>
+              <a:t>第 </a:t>
+            </a:r>
+            <a:r>
+              <a:rPr kumimoji="1" lang="en-US" altLang="ja-JP"/>
+              <a:t>2 </a:t>
+            </a:r>
+            <a:r>
+              <a:rPr kumimoji="1" lang="ja-JP" altLang="en-US"/>
+              <a:t>レベル</a:t>
             </a:r>
           </a:p>
           <a:p>
             <a:pPr lvl="2"/>
             <a:r>
-              <a:rPr lang="en-US" smtClean="0"/>
-              <a:t>Third level</a:t>
+              <a:rPr kumimoji="1" lang="ja-JP" altLang="en-US"/>
+              <a:t>第 </a:t>
+            </a:r>
+            <a:r>
+              <a:rPr kumimoji="1" lang="en-US" altLang="ja-JP"/>
+              <a:t>3 </a:t>
+            </a:r>
+            <a:r>
+              <a:rPr kumimoji="1" lang="ja-JP" altLang="en-US"/>
+              <a:t>レベル</a:t>
             </a:r>
           </a:p>
           <a:p>
             <a:pPr lvl="3"/>
             <a:r>
-              <a:rPr lang="en-US" smtClean="0"/>
-              <a:t>Fourth level</a:t>
+              <a:rPr kumimoji="1" lang="ja-JP" altLang="en-US"/>
+              <a:t>第 </a:t>
+            </a:r>
+            <a:r>
+              <a:rPr kumimoji="1" lang="en-US" altLang="ja-JP"/>
+              <a:t>4 </a:t>
+            </a:r>
+            <a:r>
+              <a:rPr kumimoji="1" lang="ja-JP" altLang="en-US"/>
+              <a:t>レベル</a:t>
             </a:r>
           </a:p>
           <a:p>
             <a:pPr lvl="4"/>
             <a:r>
-              <a:rPr lang="en-US" smtClean="0"/>
-              <a:t>Fifth level</a:t>
-            </a:r>
-            <a:endParaRPr lang="en-US"/>
-          </a:p>
-        </p:txBody>
-      </p:sp>
-      <p:sp>
-        <p:nvSpPr>
-          <p:cNvPr id="4" name="Content Placeholder 3"/>
+              <a:rPr kumimoji="1" lang="ja-JP" altLang="en-US"/>
+              <a:t>第 </a:t>
+            </a:r>
+            <a:r>
+              <a:rPr kumimoji="1" lang="en-US" altLang="ja-JP"/>
+              <a:t>5 </a:t>
+            </a:r>
+            <a:r>
+              <a:rPr kumimoji="1" lang="ja-JP" altLang="en-US"/>
+              <a:t>レベル</a:t>
+            </a:r>
+          </a:p>
+        </p:txBody>
+      </p:sp>
+      <p:sp>
+        <p:nvSpPr>
+          <p:cNvPr id="4" name="コンテンツ プレースホルダー 3">
+            <a:extLst>
+              <a:ext uri="{FF2B5EF4-FFF2-40B4-BE49-F238E27FC236}">
+                <a16:creationId xmlns:a16="http://schemas.microsoft.com/office/drawing/2014/main" id="{AF4D714B-2A78-CB9A-362C-CFAB23E01B87}"/>
+              </a:ext>
+            </a:extLst>
+          </p:cNvPr>
           <p:cNvSpPr>
             <a:spLocks noGrp="1"/>
           </p:cNvSpPr>
@@ -1625,82 +1832,91 @@
         </p:nvSpPr>
         <p:spPr>
           <a:xfrm>
-            <a:off x="4648200" y="1600200"/>
-            <a:ext cx="4038600" cy="4525963"/>
+            <a:off x="6172200" y="1825625"/>
+            <a:ext cx="5181600" cy="4351338"/>
           </a:xfrm>
         </p:spPr>
         <p:txBody>
           <a:bodyPr/>
-          <a:lstStyle>
-            <a:lvl1pPr>
-              <a:defRPr sz="2800"/>
-            </a:lvl1pPr>
-            <a:lvl2pPr>
-              <a:defRPr sz="2400"/>
-            </a:lvl2pPr>
-            <a:lvl3pPr>
-              <a:defRPr sz="2000"/>
-            </a:lvl3pPr>
-            <a:lvl4pPr>
-              <a:defRPr sz="1800"/>
-            </a:lvl4pPr>
-            <a:lvl5pPr>
-              <a:defRPr sz="1800"/>
-            </a:lvl5pPr>
-            <a:lvl6pPr>
-              <a:defRPr sz="1800"/>
-            </a:lvl6pPr>
-            <a:lvl7pPr>
-              <a:defRPr sz="1800"/>
-            </a:lvl7pPr>
-            <a:lvl8pPr>
-              <a:defRPr sz="1800"/>
-            </a:lvl8pPr>
-            <a:lvl9pPr>
-              <a:defRPr sz="1800"/>
-            </a:lvl9pPr>
-          </a:lstStyle>
+          <a:lstStyle/>
           <a:p>
             <a:pPr lvl="0"/>
             <a:r>
-              <a:rPr lang="en-US" smtClean="0"/>
-              <a:t>Click to edit Master text styles</a:t>
+              <a:rPr kumimoji="1" lang="ja-JP" altLang="en-US"/>
+              <a:t>マスター テキストの書式設定</a:t>
             </a:r>
           </a:p>
           <a:p>
             <a:pPr lvl="1"/>
             <a:r>
-              <a:rPr lang="en-US" smtClean="0"/>
-              <a:t>Second level</a:t>
+              <a:rPr kumimoji="1" lang="ja-JP" altLang="en-US"/>
+              <a:t>第 </a:t>
+            </a:r>
+            <a:r>
+              <a:rPr kumimoji="1" lang="en-US" altLang="ja-JP"/>
+              <a:t>2 </a:t>
+            </a:r>
+            <a:r>
+              <a:rPr kumimoji="1" lang="ja-JP" altLang="en-US"/>
+              <a:t>レベル</a:t>
             </a:r>
           </a:p>
           <a:p>
             <a:pPr lvl="2"/>
             <a:r>
-              <a:rPr lang="en-US" smtClean="0"/>
-              <a:t>Third level</a:t>
+              <a:rPr kumimoji="1" lang="ja-JP" altLang="en-US"/>
+              <a:t>第 </a:t>
+            </a:r>
+            <a:r>
+              <a:rPr kumimoji="1" lang="en-US" altLang="ja-JP"/>
+              <a:t>3 </a:t>
+            </a:r>
+            <a:r>
+              <a:rPr kumimoji="1" lang="ja-JP" altLang="en-US"/>
+              <a:t>レベル</a:t>
             </a:r>
           </a:p>
           <a:p>
             <a:pPr lvl="3"/>
             <a:r>
-              <a:rPr lang="en-US" smtClean="0"/>
-              <a:t>Fourth level</a:t>
+              <a:rPr kumimoji="1" lang="ja-JP" altLang="en-US"/>
+              <a:t>第 </a:t>
+            </a:r>
+            <a:r>
+              <a:rPr kumimoji="1" lang="en-US" altLang="ja-JP"/>
+              <a:t>4 </a:t>
+            </a:r>
+            <a:r>
+              <a:rPr kumimoji="1" lang="ja-JP" altLang="en-US"/>
+              <a:t>レベル</a:t>
             </a:r>
           </a:p>
           <a:p>
             <a:pPr lvl="4"/>
             <a:r>
-              <a:rPr lang="en-US" smtClean="0"/>
-              <a:t>Fifth level</a:t>
-            </a:r>
-            <a:endParaRPr lang="en-US"/>
-          </a:p>
-        </p:txBody>
-      </p:sp>
-      <p:sp>
-        <p:nvSpPr>
-          <p:cNvPr id="5" name="Date Placeholder 4"/>
+              <a:rPr kumimoji="1" lang="ja-JP" altLang="en-US"/>
+              <a:t>第 </a:t>
+            </a:r>
+            <a:r>
+              <a:rPr kumimoji="1" lang="en-US" altLang="ja-JP"/>
+              <a:t>5 </a:t>
+            </a:r>
+            <a:r>
+              <a:rPr kumimoji="1" lang="ja-JP" altLang="en-US"/>
+              <a:t>レベル</a:t>
+            </a:r>
+          </a:p>
+        </p:txBody>
+      </p:sp>
+      <p:sp>
+        <p:nvSpPr>
+          <p:cNvPr id="5" name="日付プレースホルダー 4">
+            <a:extLst>
+              <a:ext uri="{FF2B5EF4-FFF2-40B4-BE49-F238E27FC236}">
+                <a16:creationId xmlns:a16="http://schemas.microsoft.com/office/drawing/2014/main" id="{69E734F3-CBF7-223E-9474-BAE0998D1DA6}"/>
+              </a:ext>
+            </a:extLst>
+          </p:cNvPr>
           <p:cNvSpPr>
             <a:spLocks noGrp="1"/>
           </p:cNvSpPr>
@@ -1713,17 +1929,23 @@
           <a:bodyPr/>
           <a:lstStyle/>
           <a:p>
-            <a:fld id="{5BCAD085-E8A6-8845-BD4E-CB4CCA059FC4}" type="datetimeFigureOut">
-              <a:rPr lang="en-US" smtClean="0"/>
-              <a:t>1/27/13</a:t>
+            <a:fld id="{9436AD62-8BED-4F00-BDCC-CEAF4DF844F9}" type="datetimeFigureOut">
+              <a:rPr kumimoji="1" lang="ja-JP" altLang="en-US" smtClean="0"/>
+              <a:t>2025/5/12</a:t>
             </a:fld>
-            <a:endParaRPr lang="en-US"/>
-          </a:p>
-        </p:txBody>
-      </p:sp>
-      <p:sp>
-        <p:nvSpPr>
-          <p:cNvPr id="6" name="Footer Placeholder 5"/>
+            <a:endParaRPr kumimoji="1" lang="ja-JP" altLang="en-US"/>
+          </a:p>
+        </p:txBody>
+      </p:sp>
+      <p:sp>
+        <p:nvSpPr>
+          <p:cNvPr id="6" name="フッター プレースホルダー 5">
+            <a:extLst>
+              <a:ext uri="{FF2B5EF4-FFF2-40B4-BE49-F238E27FC236}">
+                <a16:creationId xmlns:a16="http://schemas.microsoft.com/office/drawing/2014/main" id="{4B4E2901-06F4-B2D3-D815-BD98D87AF87B}"/>
+              </a:ext>
+            </a:extLst>
+          </p:cNvPr>
           <p:cNvSpPr>
             <a:spLocks noGrp="1"/>
           </p:cNvSpPr>
@@ -1736,13 +1958,19 @@
           <a:bodyPr/>
           <a:lstStyle/>
           <a:p>
-            <a:endParaRPr lang="en-US"/>
-          </a:p>
-        </p:txBody>
-      </p:sp>
-      <p:sp>
-        <p:nvSpPr>
-          <p:cNvPr id="7" name="Slide Number Placeholder 6"/>
+            <a:endParaRPr kumimoji="1" lang="ja-JP" altLang="en-US"/>
+          </a:p>
+        </p:txBody>
+      </p:sp>
+      <p:sp>
+        <p:nvSpPr>
+          <p:cNvPr id="7" name="スライド番号プレースホルダー 6">
+            <a:extLst>
+              <a:ext uri="{FF2B5EF4-FFF2-40B4-BE49-F238E27FC236}">
+                <a16:creationId xmlns:a16="http://schemas.microsoft.com/office/drawing/2014/main" id="{644FFBFF-4868-8C73-E768-165528E2CCBE}"/>
+              </a:ext>
+            </a:extLst>
+          </p:cNvPr>
           <p:cNvSpPr>
             <a:spLocks noGrp="1"/>
           </p:cNvSpPr>
@@ -1755,18 +1983,18 @@
           <a:bodyPr/>
           <a:lstStyle/>
           <a:p>
-            <a:fld id="{C1FF6DA9-008F-8B48-92A6-B652298478BF}" type="slidenum">
-              <a:rPr lang="en-US" smtClean="0"/>
+            <a:fld id="{9A7F45E2-1352-4454-84E4-E63636FB022F}" type="slidenum">
+              <a:rPr kumimoji="1" lang="ja-JP" altLang="en-US" smtClean="0"/>
               <a:t>‹#›</a:t>
             </a:fld>
-            <a:endParaRPr lang="en-US"/>
+            <a:endParaRPr kumimoji="1" lang="ja-JP" altLang="en-US"/>
           </a:p>
         </p:txBody>
       </p:sp>
     </p:spTree>
     <p:extLst>
       <p:ext uri="{BB962C8B-B14F-4D97-AF65-F5344CB8AC3E}">
-        <p14:creationId xmlns:p14="http://schemas.microsoft.com/office/powerpoint/2010/main" val="2782244947"/>
+        <p14:creationId xmlns:p14="http://schemas.microsoft.com/office/powerpoint/2010/main" val="2327551028"/>
       </p:ext>
     </p:extLst>
   </p:cSld>
@@ -1778,7 +2006,7 @@
 
 <file path=ppt/slideLayouts/slideLayout5.xml><?xml version="1.0" encoding="utf-8"?>
 <p:sldLayout xmlns:a="http://schemas.openxmlformats.org/drawingml/2006/main" xmlns:r="http://schemas.openxmlformats.org/officeDocument/2006/relationships" xmlns:p="http://schemas.openxmlformats.org/presentationml/2006/main" type="twoTxTwoObj" preserve="1">
-  <p:cSld name="Comparison">
+  <p:cSld name="比較">
     <p:spTree>
       <p:nvGrpSpPr>
         <p:cNvPr id="1" name=""/>
@@ -1795,45 +2023,57 @@
       </p:grpSpPr>
       <p:sp>
         <p:nvSpPr>
-          <p:cNvPr id="2" name="Title 1"/>
+          <p:cNvPr id="2" name="タイトル 1">
+            <a:extLst>
+              <a:ext uri="{FF2B5EF4-FFF2-40B4-BE49-F238E27FC236}">
+                <a16:creationId xmlns:a16="http://schemas.microsoft.com/office/drawing/2014/main" id="{8478FEA4-1D38-23FF-C503-15ACA45FC85F}"/>
+              </a:ext>
+            </a:extLst>
+          </p:cNvPr>
           <p:cNvSpPr>
             <a:spLocks noGrp="1"/>
           </p:cNvSpPr>
           <p:nvPr>
             <p:ph type="title"/>
-          </p:nvPr>
-        </p:nvSpPr>
-        <p:spPr/>
-        <p:txBody>
-          <a:bodyPr/>
-          <a:lstStyle>
-            <a:lvl1pPr>
-              <a:defRPr/>
-            </a:lvl1pPr>
-          </a:lstStyle>
-          <a:p>
-            <a:r>
-              <a:rPr lang="en-US" smtClean="0"/>
-              <a:t>Click to edit Master title style</a:t>
-            </a:r>
-            <a:endParaRPr lang="en-US"/>
-          </a:p>
-        </p:txBody>
-      </p:sp>
-      <p:sp>
-        <p:nvSpPr>
-          <p:cNvPr id="3" name="Text Placeholder 2"/>
-          <p:cNvSpPr>
-            <a:spLocks noGrp="1"/>
-          </p:cNvSpPr>
-          <p:nvPr>
-            <p:ph type="body" idx="1"/>
           </p:nvPr>
         </p:nvSpPr>
         <p:spPr>
           <a:xfrm>
-            <a:off x="457200" y="1535113"/>
-            <a:ext cx="4040188" cy="639762"/>
+            <a:off x="839788" y="365125"/>
+            <a:ext cx="10515600" cy="1325563"/>
+          </a:xfrm>
+        </p:spPr>
+        <p:txBody>
+          <a:bodyPr/>
+          <a:lstStyle/>
+          <a:p>
+            <a:r>
+              <a:rPr kumimoji="1" lang="ja-JP" altLang="en-US"/>
+              <a:t>マスター タイトルの書式設定</a:t>
+            </a:r>
+          </a:p>
+        </p:txBody>
+      </p:sp>
+      <p:sp>
+        <p:nvSpPr>
+          <p:cNvPr id="3" name="テキスト プレースホルダー 2">
+            <a:extLst>
+              <a:ext uri="{FF2B5EF4-FFF2-40B4-BE49-F238E27FC236}">
+                <a16:creationId xmlns:a16="http://schemas.microsoft.com/office/drawing/2014/main" id="{CA4FF698-97BE-5878-061B-B698225EB480}"/>
+              </a:ext>
+            </a:extLst>
+          </p:cNvPr>
+          <p:cNvSpPr>
+            <a:spLocks noGrp="1"/>
+          </p:cNvSpPr>
+          <p:nvPr>
+            <p:ph type="body" idx="1"/>
+          </p:nvPr>
+        </p:nvSpPr>
+        <p:spPr>
+          <a:xfrm>
+            <a:off x="839788" y="1681163"/>
+            <a:ext cx="5157787" cy="823912"/>
           </a:xfrm>
         </p:spPr>
         <p:txBody>
@@ -1879,15 +2119,21 @@
           <a:p>
             <a:pPr lvl="0"/>
             <a:r>
-              <a:rPr lang="en-US" smtClean="0"/>
-              <a:t>Click to edit Master text styles</a:t>
-            </a:r>
-          </a:p>
-        </p:txBody>
-      </p:sp>
-      <p:sp>
-        <p:nvSpPr>
-          <p:cNvPr id="4" name="Content Placeholder 3"/>
+              <a:rPr kumimoji="1" lang="ja-JP" altLang="en-US"/>
+              <a:t>マスター テキストの書式設定</a:t>
+            </a:r>
+          </a:p>
+        </p:txBody>
+      </p:sp>
+      <p:sp>
+        <p:nvSpPr>
+          <p:cNvPr id="4" name="コンテンツ プレースホルダー 3">
+            <a:extLst>
+              <a:ext uri="{FF2B5EF4-FFF2-40B4-BE49-F238E27FC236}">
+                <a16:creationId xmlns:a16="http://schemas.microsoft.com/office/drawing/2014/main" id="{6946A340-09A0-A68F-F7F0-BE5BA7D5AE25}"/>
+              </a:ext>
+            </a:extLst>
+          </p:cNvPr>
           <p:cNvSpPr>
             <a:spLocks noGrp="1"/>
           </p:cNvSpPr>
@@ -1897,82 +2143,91 @@
         </p:nvSpPr>
         <p:spPr>
           <a:xfrm>
-            <a:off x="457200" y="2174875"/>
-            <a:ext cx="4040188" cy="3951288"/>
+            <a:off x="839788" y="2505075"/>
+            <a:ext cx="5157787" cy="3684588"/>
           </a:xfrm>
         </p:spPr>
         <p:txBody>
           <a:bodyPr/>
-          <a:lstStyle>
-            <a:lvl1pPr>
-              <a:defRPr sz="2400"/>
-            </a:lvl1pPr>
-            <a:lvl2pPr>
-              <a:defRPr sz="2000"/>
-            </a:lvl2pPr>
-            <a:lvl3pPr>
-              <a:defRPr sz="1800"/>
-            </a:lvl3pPr>
-            <a:lvl4pPr>
-              <a:defRPr sz="1600"/>
-            </a:lvl4pPr>
-            <a:lvl5pPr>
-              <a:defRPr sz="1600"/>
-            </a:lvl5pPr>
-            <a:lvl6pPr>
-              <a:defRPr sz="1600"/>
-            </a:lvl6pPr>
-            <a:lvl7pPr>
-              <a:defRPr sz="1600"/>
-            </a:lvl7pPr>
-            <a:lvl8pPr>
-              <a:defRPr sz="1600"/>
-            </a:lvl8pPr>
-            <a:lvl9pPr>
-              <a:defRPr sz="1600"/>
-            </a:lvl9pPr>
-          </a:lstStyle>
+          <a:lstStyle/>
           <a:p>
             <a:pPr lvl="0"/>
             <a:r>
-              <a:rPr lang="en-US" smtClean="0"/>
-              <a:t>Click to edit Master text styles</a:t>
+              <a:rPr kumimoji="1" lang="ja-JP" altLang="en-US"/>
+              <a:t>マスター テキストの書式設定</a:t>
             </a:r>
           </a:p>
           <a:p>
             <a:pPr lvl="1"/>
             <a:r>
-              <a:rPr lang="en-US" smtClean="0"/>
-              <a:t>Second level</a:t>
+              <a:rPr kumimoji="1" lang="ja-JP" altLang="en-US"/>
+              <a:t>第 </a:t>
+            </a:r>
+            <a:r>
+              <a:rPr kumimoji="1" lang="en-US" altLang="ja-JP"/>
+              <a:t>2 </a:t>
+            </a:r>
+            <a:r>
+              <a:rPr kumimoji="1" lang="ja-JP" altLang="en-US"/>
+              <a:t>レベル</a:t>
             </a:r>
           </a:p>
           <a:p>
             <a:pPr lvl="2"/>
             <a:r>
-              <a:rPr lang="en-US" smtClean="0"/>
-              <a:t>Third level</a:t>
+              <a:rPr kumimoji="1" lang="ja-JP" altLang="en-US"/>
+              <a:t>第 </a:t>
+            </a:r>
+            <a:r>
+              <a:rPr kumimoji="1" lang="en-US" altLang="ja-JP"/>
+              <a:t>3 </a:t>
+            </a:r>
+            <a:r>
+              <a:rPr kumimoji="1" lang="ja-JP" altLang="en-US"/>
+              <a:t>レベル</a:t>
             </a:r>
           </a:p>
           <a:p>
             <a:pPr lvl="3"/>
             <a:r>
-              <a:rPr lang="en-US" smtClean="0"/>
-              <a:t>Fourth level</a:t>
+              <a:rPr kumimoji="1" lang="ja-JP" altLang="en-US"/>
+              <a:t>第 </a:t>
+            </a:r>
+            <a:r>
+              <a:rPr kumimoji="1" lang="en-US" altLang="ja-JP"/>
+              <a:t>4 </a:t>
+            </a:r>
+            <a:r>
+              <a:rPr kumimoji="1" lang="ja-JP" altLang="en-US"/>
+              <a:t>レベル</a:t>
             </a:r>
           </a:p>
           <a:p>
             <a:pPr lvl="4"/>
             <a:r>
-              <a:rPr lang="en-US" smtClean="0"/>
-              <a:t>Fifth level</a:t>
-            </a:r>
-            <a:endParaRPr lang="en-US"/>
-          </a:p>
-        </p:txBody>
-      </p:sp>
-      <p:sp>
-        <p:nvSpPr>
-          <p:cNvPr id="5" name="Text Placeholder 4"/>
+              <a:rPr kumimoji="1" lang="ja-JP" altLang="en-US"/>
+              <a:t>第 </a:t>
+            </a:r>
+            <a:r>
+              <a:rPr kumimoji="1" lang="en-US" altLang="ja-JP"/>
+              <a:t>5 </a:t>
+            </a:r>
+            <a:r>
+              <a:rPr kumimoji="1" lang="ja-JP" altLang="en-US"/>
+              <a:t>レベル</a:t>
+            </a:r>
+          </a:p>
+        </p:txBody>
+      </p:sp>
+      <p:sp>
+        <p:nvSpPr>
+          <p:cNvPr id="5" name="テキスト プレースホルダー 4">
+            <a:extLst>
+              <a:ext uri="{FF2B5EF4-FFF2-40B4-BE49-F238E27FC236}">
+                <a16:creationId xmlns:a16="http://schemas.microsoft.com/office/drawing/2014/main" id="{E1B8553E-9D9C-843C-A397-9D028CDBE2B0}"/>
+              </a:ext>
+            </a:extLst>
+          </p:cNvPr>
           <p:cNvSpPr>
             <a:spLocks noGrp="1"/>
           </p:cNvSpPr>
@@ -1982,8 +2237,8 @@
         </p:nvSpPr>
         <p:spPr>
           <a:xfrm>
-            <a:off x="4645025" y="1535113"/>
-            <a:ext cx="4041775" cy="639762"/>
+            <a:off x="6172200" y="1681163"/>
+            <a:ext cx="5183188" cy="823912"/>
           </a:xfrm>
         </p:spPr>
         <p:txBody>
@@ -2029,15 +2284,21 @@
           <a:p>
             <a:pPr lvl="0"/>
             <a:r>
-              <a:rPr lang="en-US" smtClean="0"/>
-              <a:t>Click to edit Master text styles</a:t>
-            </a:r>
-          </a:p>
-        </p:txBody>
-      </p:sp>
-      <p:sp>
-        <p:nvSpPr>
-          <p:cNvPr id="6" name="Content Placeholder 5"/>
+              <a:rPr kumimoji="1" lang="ja-JP" altLang="en-US"/>
+              <a:t>マスター テキストの書式設定</a:t>
+            </a:r>
+          </a:p>
+        </p:txBody>
+      </p:sp>
+      <p:sp>
+        <p:nvSpPr>
+          <p:cNvPr id="6" name="コンテンツ プレースホルダー 5">
+            <a:extLst>
+              <a:ext uri="{FF2B5EF4-FFF2-40B4-BE49-F238E27FC236}">
+                <a16:creationId xmlns:a16="http://schemas.microsoft.com/office/drawing/2014/main" id="{D22FBCD9-042E-BB2B-6908-633E41837AC0}"/>
+              </a:ext>
+            </a:extLst>
+          </p:cNvPr>
           <p:cNvSpPr>
             <a:spLocks noGrp="1"/>
           </p:cNvSpPr>
@@ -2047,82 +2308,91 @@
         </p:nvSpPr>
         <p:spPr>
           <a:xfrm>
-            <a:off x="4645025" y="2174875"/>
-            <a:ext cx="4041775" cy="3951288"/>
+            <a:off x="6172200" y="2505075"/>
+            <a:ext cx="5183188" cy="3684588"/>
           </a:xfrm>
         </p:spPr>
         <p:txBody>
           <a:bodyPr/>
-          <a:lstStyle>
-            <a:lvl1pPr>
-              <a:defRPr sz="2400"/>
-            </a:lvl1pPr>
-            <a:lvl2pPr>
-              <a:defRPr sz="2000"/>
-            </a:lvl2pPr>
-            <a:lvl3pPr>
-              <a:defRPr sz="1800"/>
-            </a:lvl3pPr>
-            <a:lvl4pPr>
-              <a:defRPr sz="1600"/>
-            </a:lvl4pPr>
-            <a:lvl5pPr>
-              <a:defRPr sz="1600"/>
-            </a:lvl5pPr>
-            <a:lvl6pPr>
-              <a:defRPr sz="1600"/>
-            </a:lvl6pPr>
-            <a:lvl7pPr>
-              <a:defRPr sz="1600"/>
-            </a:lvl7pPr>
-            <a:lvl8pPr>
-              <a:defRPr sz="1600"/>
-            </a:lvl8pPr>
-            <a:lvl9pPr>
-              <a:defRPr sz="1600"/>
-            </a:lvl9pPr>
-          </a:lstStyle>
+          <a:lstStyle/>
           <a:p>
             <a:pPr lvl="0"/>
             <a:r>
-              <a:rPr lang="en-US" smtClean="0"/>
-              <a:t>Click to edit Master text styles</a:t>
+              <a:rPr kumimoji="1" lang="ja-JP" altLang="en-US"/>
+              <a:t>マスター テキストの書式設定</a:t>
             </a:r>
           </a:p>
           <a:p>
             <a:pPr lvl="1"/>
             <a:r>
-              <a:rPr lang="en-US" smtClean="0"/>
-              <a:t>Second level</a:t>
+              <a:rPr kumimoji="1" lang="ja-JP" altLang="en-US"/>
+              <a:t>第 </a:t>
+            </a:r>
+            <a:r>
+              <a:rPr kumimoji="1" lang="en-US" altLang="ja-JP"/>
+              <a:t>2 </a:t>
+            </a:r>
+            <a:r>
+              <a:rPr kumimoji="1" lang="ja-JP" altLang="en-US"/>
+              <a:t>レベル</a:t>
             </a:r>
           </a:p>
           <a:p>
             <a:pPr lvl="2"/>
             <a:r>
-              <a:rPr lang="en-US" smtClean="0"/>
-              <a:t>Third level</a:t>
+              <a:rPr kumimoji="1" lang="ja-JP" altLang="en-US"/>
+              <a:t>第 </a:t>
+            </a:r>
+            <a:r>
+              <a:rPr kumimoji="1" lang="en-US" altLang="ja-JP"/>
+              <a:t>3 </a:t>
+            </a:r>
+            <a:r>
+              <a:rPr kumimoji="1" lang="ja-JP" altLang="en-US"/>
+              <a:t>レベル</a:t>
             </a:r>
           </a:p>
           <a:p>
             <a:pPr lvl="3"/>
             <a:r>
-              <a:rPr lang="en-US" smtClean="0"/>
-              <a:t>Fourth level</a:t>
+              <a:rPr kumimoji="1" lang="ja-JP" altLang="en-US"/>
+              <a:t>第 </a:t>
+            </a:r>
+            <a:r>
+              <a:rPr kumimoji="1" lang="en-US" altLang="ja-JP"/>
+              <a:t>4 </a:t>
+            </a:r>
+            <a:r>
+              <a:rPr kumimoji="1" lang="ja-JP" altLang="en-US"/>
+              <a:t>レベル</a:t>
             </a:r>
           </a:p>
           <a:p>
             <a:pPr lvl="4"/>
             <a:r>
-              <a:rPr lang="en-US" smtClean="0"/>
-              <a:t>Fifth level</a:t>
-            </a:r>
-            <a:endParaRPr lang="en-US"/>
-          </a:p>
-        </p:txBody>
-      </p:sp>
-      <p:sp>
-        <p:nvSpPr>
-          <p:cNvPr id="7" name="Date Placeholder 6"/>
+              <a:rPr kumimoji="1" lang="ja-JP" altLang="en-US"/>
+              <a:t>第 </a:t>
+            </a:r>
+            <a:r>
+              <a:rPr kumimoji="1" lang="en-US" altLang="ja-JP"/>
+              <a:t>5 </a:t>
+            </a:r>
+            <a:r>
+              <a:rPr kumimoji="1" lang="ja-JP" altLang="en-US"/>
+              <a:t>レベル</a:t>
+            </a:r>
+          </a:p>
+        </p:txBody>
+      </p:sp>
+      <p:sp>
+        <p:nvSpPr>
+          <p:cNvPr id="7" name="日付プレースホルダー 6">
+            <a:extLst>
+              <a:ext uri="{FF2B5EF4-FFF2-40B4-BE49-F238E27FC236}">
+                <a16:creationId xmlns:a16="http://schemas.microsoft.com/office/drawing/2014/main" id="{DAE9C221-0133-7458-9A7F-F6680162AF7C}"/>
+              </a:ext>
+            </a:extLst>
+          </p:cNvPr>
           <p:cNvSpPr>
             <a:spLocks noGrp="1"/>
           </p:cNvSpPr>
@@ -2135,17 +2405,23 @@
           <a:bodyPr/>
           <a:lstStyle/>
           <a:p>
-            <a:fld id="{5BCAD085-E8A6-8845-BD4E-CB4CCA059FC4}" type="datetimeFigureOut">
-              <a:rPr lang="en-US" smtClean="0"/>
-              <a:t>1/27/13</a:t>
+            <a:fld id="{9436AD62-8BED-4F00-BDCC-CEAF4DF844F9}" type="datetimeFigureOut">
+              <a:rPr kumimoji="1" lang="ja-JP" altLang="en-US" smtClean="0"/>
+              <a:t>2025/5/12</a:t>
             </a:fld>
-            <a:endParaRPr lang="en-US"/>
-          </a:p>
-        </p:txBody>
-      </p:sp>
-      <p:sp>
-        <p:nvSpPr>
-          <p:cNvPr id="8" name="Footer Placeholder 7"/>
+            <a:endParaRPr kumimoji="1" lang="ja-JP" altLang="en-US"/>
+          </a:p>
+        </p:txBody>
+      </p:sp>
+      <p:sp>
+        <p:nvSpPr>
+          <p:cNvPr id="8" name="フッター プレースホルダー 7">
+            <a:extLst>
+              <a:ext uri="{FF2B5EF4-FFF2-40B4-BE49-F238E27FC236}">
+                <a16:creationId xmlns:a16="http://schemas.microsoft.com/office/drawing/2014/main" id="{D45871EF-4821-0C8E-4F00-B2BE70BEB1D1}"/>
+              </a:ext>
+            </a:extLst>
+          </p:cNvPr>
           <p:cNvSpPr>
             <a:spLocks noGrp="1"/>
           </p:cNvSpPr>
@@ -2158,13 +2434,19 @@
           <a:bodyPr/>
           <a:lstStyle/>
           <a:p>
-            <a:endParaRPr lang="en-US"/>
-          </a:p>
-        </p:txBody>
-      </p:sp>
-      <p:sp>
-        <p:nvSpPr>
-          <p:cNvPr id="9" name="Slide Number Placeholder 8"/>
+            <a:endParaRPr kumimoji="1" lang="ja-JP" altLang="en-US"/>
+          </a:p>
+        </p:txBody>
+      </p:sp>
+      <p:sp>
+        <p:nvSpPr>
+          <p:cNvPr id="9" name="スライド番号プレースホルダー 8">
+            <a:extLst>
+              <a:ext uri="{FF2B5EF4-FFF2-40B4-BE49-F238E27FC236}">
+                <a16:creationId xmlns:a16="http://schemas.microsoft.com/office/drawing/2014/main" id="{E3FF271A-A12C-2868-B06D-14D2F2AD1BB1}"/>
+              </a:ext>
+            </a:extLst>
+          </p:cNvPr>
           <p:cNvSpPr>
             <a:spLocks noGrp="1"/>
           </p:cNvSpPr>
@@ -2177,18 +2459,18 @@
           <a:bodyPr/>
           <a:lstStyle/>
           <a:p>
-            <a:fld id="{C1FF6DA9-008F-8B48-92A6-B652298478BF}" type="slidenum">
-              <a:rPr lang="en-US" smtClean="0"/>
+            <a:fld id="{9A7F45E2-1352-4454-84E4-E63636FB022F}" type="slidenum">
+              <a:rPr kumimoji="1" lang="ja-JP" altLang="en-US" smtClean="0"/>
               <a:t>‹#›</a:t>
             </a:fld>
-            <a:endParaRPr lang="en-US"/>
+            <a:endParaRPr kumimoji="1" lang="ja-JP" altLang="en-US"/>
           </a:p>
         </p:txBody>
       </p:sp>
     </p:spTree>
     <p:extLst>
       <p:ext uri="{BB962C8B-B14F-4D97-AF65-F5344CB8AC3E}">
-        <p14:creationId xmlns:p14="http://schemas.microsoft.com/office/powerpoint/2010/main" val="990158736"/>
+        <p14:creationId xmlns:p14="http://schemas.microsoft.com/office/powerpoint/2010/main" val="2651453481"/>
       </p:ext>
     </p:extLst>
   </p:cSld>
@@ -2200,7 +2482,7 @@
 
 <file path=ppt/slideLayouts/slideLayout6.xml><?xml version="1.0" encoding="utf-8"?>
 <p:sldLayout xmlns:a="http://schemas.openxmlformats.org/drawingml/2006/main" xmlns:r="http://schemas.openxmlformats.org/officeDocument/2006/relationships" xmlns:p="http://schemas.openxmlformats.org/presentationml/2006/main" type="titleOnly" preserve="1">
-  <p:cSld name="Title Only">
+  <p:cSld name="タイトルのみ">
     <p:spTree>
       <p:nvGrpSpPr>
         <p:cNvPr id="1" name=""/>
@@ -2217,7 +2499,13 @@
       </p:grpSpPr>
       <p:sp>
         <p:nvSpPr>
-          <p:cNvPr id="2" name="Title 1"/>
+          <p:cNvPr id="2" name="タイトル 1">
+            <a:extLst>
+              <a:ext uri="{FF2B5EF4-FFF2-40B4-BE49-F238E27FC236}">
+                <a16:creationId xmlns:a16="http://schemas.microsoft.com/office/drawing/2014/main" id="{139CF353-5705-1B83-5C79-E56E2FAFD344}"/>
+              </a:ext>
+            </a:extLst>
+          </p:cNvPr>
           <p:cNvSpPr>
             <a:spLocks noGrp="1"/>
           </p:cNvSpPr>
@@ -2231,16 +2519,21 @@
           <a:lstStyle/>
           <a:p>
             <a:r>
-              <a:rPr lang="en-US" smtClean="0"/>
-              <a:t>Click to edit Master title style</a:t>
-            </a:r>
-            <a:endParaRPr lang="en-US"/>
-          </a:p>
-        </p:txBody>
-      </p:sp>
-      <p:sp>
-        <p:nvSpPr>
-          <p:cNvPr id="3" name="Date Placeholder 2"/>
+              <a:rPr kumimoji="1" lang="ja-JP" altLang="en-US"/>
+              <a:t>マスター タイトルの書式設定</a:t>
+            </a:r>
+          </a:p>
+        </p:txBody>
+      </p:sp>
+      <p:sp>
+        <p:nvSpPr>
+          <p:cNvPr id="3" name="日付プレースホルダー 2">
+            <a:extLst>
+              <a:ext uri="{FF2B5EF4-FFF2-40B4-BE49-F238E27FC236}">
+                <a16:creationId xmlns:a16="http://schemas.microsoft.com/office/drawing/2014/main" id="{842BDCD7-F08C-E260-F122-98855C21177C}"/>
+              </a:ext>
+            </a:extLst>
+          </p:cNvPr>
           <p:cNvSpPr>
             <a:spLocks noGrp="1"/>
           </p:cNvSpPr>
@@ -2253,17 +2546,23 @@
           <a:bodyPr/>
           <a:lstStyle/>
           <a:p>
-            <a:fld id="{5BCAD085-E8A6-8845-BD4E-CB4CCA059FC4}" type="datetimeFigureOut">
-              <a:rPr lang="en-US" smtClean="0"/>
-              <a:t>1/27/13</a:t>
+            <a:fld id="{9436AD62-8BED-4F00-BDCC-CEAF4DF844F9}" type="datetimeFigureOut">
+              <a:rPr kumimoji="1" lang="ja-JP" altLang="en-US" smtClean="0"/>
+              <a:t>2025/5/12</a:t>
             </a:fld>
-            <a:endParaRPr lang="en-US"/>
-          </a:p>
-        </p:txBody>
-      </p:sp>
-      <p:sp>
-        <p:nvSpPr>
-          <p:cNvPr id="4" name="Footer Placeholder 3"/>
+            <a:endParaRPr kumimoji="1" lang="ja-JP" altLang="en-US"/>
+          </a:p>
+        </p:txBody>
+      </p:sp>
+      <p:sp>
+        <p:nvSpPr>
+          <p:cNvPr id="4" name="フッター プレースホルダー 3">
+            <a:extLst>
+              <a:ext uri="{FF2B5EF4-FFF2-40B4-BE49-F238E27FC236}">
+                <a16:creationId xmlns:a16="http://schemas.microsoft.com/office/drawing/2014/main" id="{9CDA0F53-282E-B4CE-F3B5-849E92B41B06}"/>
+              </a:ext>
+            </a:extLst>
+          </p:cNvPr>
           <p:cNvSpPr>
             <a:spLocks noGrp="1"/>
           </p:cNvSpPr>
@@ -2276,13 +2575,19 @@
           <a:bodyPr/>
           <a:lstStyle/>
           <a:p>
-            <a:endParaRPr lang="en-US"/>
-          </a:p>
-        </p:txBody>
-      </p:sp>
-      <p:sp>
-        <p:nvSpPr>
-          <p:cNvPr id="5" name="Slide Number Placeholder 4"/>
+            <a:endParaRPr kumimoji="1" lang="ja-JP" altLang="en-US"/>
+          </a:p>
+        </p:txBody>
+      </p:sp>
+      <p:sp>
+        <p:nvSpPr>
+          <p:cNvPr id="5" name="スライド番号プレースホルダー 4">
+            <a:extLst>
+              <a:ext uri="{FF2B5EF4-FFF2-40B4-BE49-F238E27FC236}">
+                <a16:creationId xmlns:a16="http://schemas.microsoft.com/office/drawing/2014/main" id="{4889E825-FC9A-18D3-340B-46C20C48D26C}"/>
+              </a:ext>
+            </a:extLst>
+          </p:cNvPr>
           <p:cNvSpPr>
             <a:spLocks noGrp="1"/>
           </p:cNvSpPr>
@@ -2295,18 +2600,18 @@
           <a:bodyPr/>
           <a:lstStyle/>
           <a:p>
-            <a:fld id="{C1FF6DA9-008F-8B48-92A6-B652298478BF}" type="slidenum">
-              <a:rPr lang="en-US" smtClean="0"/>
+            <a:fld id="{9A7F45E2-1352-4454-84E4-E63636FB022F}" type="slidenum">
+              <a:rPr kumimoji="1" lang="ja-JP" altLang="en-US" smtClean="0"/>
               <a:t>‹#›</a:t>
             </a:fld>
-            <a:endParaRPr lang="en-US"/>
+            <a:endParaRPr kumimoji="1" lang="ja-JP" altLang="en-US"/>
           </a:p>
         </p:txBody>
       </p:sp>
     </p:spTree>
     <p:extLst>
       <p:ext uri="{BB962C8B-B14F-4D97-AF65-F5344CB8AC3E}">
-        <p14:creationId xmlns:p14="http://schemas.microsoft.com/office/powerpoint/2010/main" val="727027711"/>
+        <p14:creationId xmlns:p14="http://schemas.microsoft.com/office/powerpoint/2010/main" val="3102137618"/>
       </p:ext>
     </p:extLst>
   </p:cSld>
@@ -2318,7 +2623,7 @@
 
 <file path=ppt/slideLayouts/slideLayout7.xml><?xml version="1.0" encoding="utf-8"?>
 <p:sldLayout xmlns:a="http://schemas.openxmlformats.org/drawingml/2006/main" xmlns:r="http://schemas.openxmlformats.org/officeDocument/2006/relationships" xmlns:p="http://schemas.openxmlformats.org/presentationml/2006/main" type="blank" preserve="1">
-  <p:cSld name="Blank">
+  <p:cSld name="白紙">
     <p:spTree>
       <p:nvGrpSpPr>
         <p:cNvPr id="1" name=""/>
@@ -2335,7 +2640,13 @@
       </p:grpSpPr>
       <p:sp>
         <p:nvSpPr>
-          <p:cNvPr id="2" name="Date Placeholder 1"/>
+          <p:cNvPr id="2" name="日付プレースホルダー 1">
+            <a:extLst>
+              <a:ext uri="{FF2B5EF4-FFF2-40B4-BE49-F238E27FC236}">
+                <a16:creationId xmlns:a16="http://schemas.microsoft.com/office/drawing/2014/main" id="{B101EED4-52D3-5873-5A5A-0F48B66F084A}"/>
+              </a:ext>
+            </a:extLst>
+          </p:cNvPr>
           <p:cNvSpPr>
             <a:spLocks noGrp="1"/>
           </p:cNvSpPr>
@@ -2348,17 +2659,23 @@
           <a:bodyPr/>
           <a:lstStyle/>
           <a:p>
-            <a:fld id="{5BCAD085-E8A6-8845-BD4E-CB4CCA059FC4}" type="datetimeFigureOut">
-              <a:rPr lang="en-US" smtClean="0"/>
-              <a:t>1/27/13</a:t>
+            <a:fld id="{9436AD62-8BED-4F00-BDCC-CEAF4DF844F9}" type="datetimeFigureOut">
+              <a:rPr kumimoji="1" lang="ja-JP" altLang="en-US" smtClean="0"/>
+              <a:t>2025/5/12</a:t>
             </a:fld>
-            <a:endParaRPr lang="en-US"/>
-          </a:p>
-        </p:txBody>
-      </p:sp>
-      <p:sp>
-        <p:nvSpPr>
-          <p:cNvPr id="3" name="Footer Placeholder 2"/>
+            <a:endParaRPr kumimoji="1" lang="ja-JP" altLang="en-US"/>
+          </a:p>
+        </p:txBody>
+      </p:sp>
+      <p:sp>
+        <p:nvSpPr>
+          <p:cNvPr id="3" name="フッター プレースホルダー 2">
+            <a:extLst>
+              <a:ext uri="{FF2B5EF4-FFF2-40B4-BE49-F238E27FC236}">
+                <a16:creationId xmlns:a16="http://schemas.microsoft.com/office/drawing/2014/main" id="{78F3ACEC-7846-F6D2-AAD4-4DCF61967C84}"/>
+              </a:ext>
+            </a:extLst>
+          </p:cNvPr>
           <p:cNvSpPr>
             <a:spLocks noGrp="1"/>
           </p:cNvSpPr>
@@ -2371,13 +2688,19 @@
           <a:bodyPr/>
           <a:lstStyle/>
           <a:p>
-            <a:endParaRPr lang="en-US"/>
-          </a:p>
-        </p:txBody>
-      </p:sp>
-      <p:sp>
-        <p:nvSpPr>
-          <p:cNvPr id="4" name="Slide Number Placeholder 3"/>
+            <a:endParaRPr kumimoji="1" lang="ja-JP" altLang="en-US"/>
+          </a:p>
+        </p:txBody>
+      </p:sp>
+      <p:sp>
+        <p:nvSpPr>
+          <p:cNvPr id="4" name="スライド番号プレースホルダー 3">
+            <a:extLst>
+              <a:ext uri="{FF2B5EF4-FFF2-40B4-BE49-F238E27FC236}">
+                <a16:creationId xmlns:a16="http://schemas.microsoft.com/office/drawing/2014/main" id="{8F6777F8-9203-5251-20CA-259D8FE4A925}"/>
+              </a:ext>
+            </a:extLst>
+          </p:cNvPr>
           <p:cNvSpPr>
             <a:spLocks noGrp="1"/>
           </p:cNvSpPr>
@@ -2390,18 +2713,18 @@
           <a:bodyPr/>
           <a:lstStyle/>
           <a:p>
-            <a:fld id="{C1FF6DA9-008F-8B48-92A6-B652298478BF}" type="slidenum">
-              <a:rPr lang="en-US" smtClean="0"/>
+            <a:fld id="{9A7F45E2-1352-4454-84E4-E63636FB022F}" type="slidenum">
+              <a:rPr kumimoji="1" lang="ja-JP" altLang="en-US" smtClean="0"/>
               <a:t>‹#›</a:t>
             </a:fld>
-            <a:endParaRPr lang="en-US"/>
+            <a:endParaRPr kumimoji="1" lang="ja-JP" altLang="en-US"/>
           </a:p>
         </p:txBody>
       </p:sp>
     </p:spTree>
     <p:extLst>
       <p:ext uri="{BB962C8B-B14F-4D97-AF65-F5344CB8AC3E}">
-        <p14:creationId xmlns:p14="http://schemas.microsoft.com/office/powerpoint/2010/main" val="1212999818"/>
+        <p14:creationId xmlns:p14="http://schemas.microsoft.com/office/powerpoint/2010/main" val="3091861954"/>
       </p:ext>
     </p:extLst>
   </p:cSld>
@@ -2413,7 +2736,7 @@
 
 <file path=ppt/slideLayouts/slideLayout8.xml><?xml version="1.0" encoding="utf-8"?>
 <p:sldLayout xmlns:a="http://schemas.openxmlformats.org/drawingml/2006/main" xmlns:r="http://schemas.openxmlformats.org/officeDocument/2006/relationships" xmlns:p="http://schemas.openxmlformats.org/presentationml/2006/main" type="objTx" preserve="1">
-  <p:cSld name="Content with Caption">
+  <p:cSld name="タイトル付きのコンテンツ">
     <p:spTree>
       <p:nvGrpSpPr>
         <p:cNvPr id="1" name=""/>
@@ -2430,7 +2753,13 @@
       </p:grpSpPr>
       <p:sp>
         <p:nvSpPr>
-          <p:cNvPr id="2" name="Title 1"/>
+          <p:cNvPr id="2" name="タイトル 1">
+            <a:extLst>
+              <a:ext uri="{FF2B5EF4-FFF2-40B4-BE49-F238E27FC236}">
+                <a16:creationId xmlns:a16="http://schemas.microsoft.com/office/drawing/2014/main" id="{7FA0E2BF-9587-776F-7A18-5A956690B833}"/>
+              </a:ext>
+            </a:extLst>
+          </p:cNvPr>
           <p:cNvSpPr>
             <a:spLocks noGrp="1"/>
           </p:cNvSpPr>
@@ -2440,29 +2769,34 @@
         </p:nvSpPr>
         <p:spPr>
           <a:xfrm>
-            <a:off x="457200" y="273050"/>
-            <a:ext cx="3008313" cy="1162050"/>
+            <a:off x="839788" y="457200"/>
+            <a:ext cx="3932237" cy="1600200"/>
           </a:xfrm>
         </p:spPr>
         <p:txBody>
           <a:bodyPr anchor="b"/>
           <a:lstStyle>
-            <a:lvl1pPr algn="l">
-              <a:defRPr sz="2000" b="1"/>
+            <a:lvl1pPr>
+              <a:defRPr sz="3200"/>
             </a:lvl1pPr>
           </a:lstStyle>
           <a:p>
             <a:r>
-              <a:rPr lang="en-US" smtClean="0"/>
-              <a:t>Click to edit Master title style</a:t>
-            </a:r>
-            <a:endParaRPr lang="en-US"/>
-          </a:p>
-        </p:txBody>
-      </p:sp>
-      <p:sp>
-        <p:nvSpPr>
-          <p:cNvPr id="3" name="Content Placeholder 2"/>
+              <a:rPr kumimoji="1" lang="ja-JP" altLang="en-US"/>
+              <a:t>マスター タイトルの書式設定</a:t>
+            </a:r>
+          </a:p>
+        </p:txBody>
+      </p:sp>
+      <p:sp>
+        <p:nvSpPr>
+          <p:cNvPr id="3" name="コンテンツ プレースホルダー 2">
+            <a:extLst>
+              <a:ext uri="{FF2B5EF4-FFF2-40B4-BE49-F238E27FC236}">
+                <a16:creationId xmlns:a16="http://schemas.microsoft.com/office/drawing/2014/main" id="{609ABAFB-F010-08F7-7461-78A4EACBC42B}"/>
+              </a:ext>
+            </a:extLst>
+          </p:cNvPr>
           <p:cNvSpPr>
             <a:spLocks noGrp="1"/>
           </p:cNvSpPr>
@@ -2472,8 +2806,8 @@
         </p:nvSpPr>
         <p:spPr>
           <a:xfrm>
-            <a:off x="3575050" y="273050"/>
-            <a:ext cx="5111750" cy="5853113"/>
+            <a:off x="5183188" y="987425"/>
+            <a:ext cx="6172200" cy="4873625"/>
           </a:xfrm>
         </p:spPr>
         <p:txBody>
@@ -2510,44 +2844,81 @@
           <a:p>
             <a:pPr lvl="0"/>
             <a:r>
-              <a:rPr lang="en-US" smtClean="0"/>
-              <a:t>Click to edit Master text styles</a:t>
+              <a:rPr kumimoji="1" lang="ja-JP" altLang="en-US"/>
+              <a:t>マスター テキストの書式設定</a:t>
             </a:r>
           </a:p>
           <a:p>
             <a:pPr lvl="1"/>
             <a:r>
-              <a:rPr lang="en-US" smtClean="0"/>
-              <a:t>Second level</a:t>
+              <a:rPr kumimoji="1" lang="ja-JP" altLang="en-US"/>
+              <a:t>第 </a:t>
+            </a:r>
+            <a:r>
+              <a:rPr kumimoji="1" lang="en-US" altLang="ja-JP"/>
+              <a:t>2 </a:t>
+            </a:r>
+            <a:r>
+              <a:rPr kumimoji="1" lang="ja-JP" altLang="en-US"/>
+              <a:t>レベル</a:t>
             </a:r>
           </a:p>
           <a:p>
             <a:pPr lvl="2"/>
             <a:r>
-              <a:rPr lang="en-US" smtClean="0"/>
-              <a:t>Third level</a:t>
+              <a:rPr kumimoji="1" lang="ja-JP" altLang="en-US"/>
+              <a:t>第 </a:t>
+            </a:r>
+            <a:r>
+              <a:rPr kumimoji="1" lang="en-US" altLang="ja-JP"/>
+              <a:t>3 </a:t>
+            </a:r>
+            <a:r>
+              <a:rPr kumimoji="1" lang="ja-JP" altLang="en-US"/>
+              <a:t>レベル</a:t>
             </a:r>
           </a:p>
           <a:p>
             <a:pPr lvl="3"/>
             <a:r>
-              <a:rPr lang="en-US" smtClean="0"/>
-              <a:t>Fourth level</a:t>
+              <a:rPr kumimoji="1" lang="ja-JP" altLang="en-US"/>
+              <a:t>第 </a:t>
+            </a:r>
+            <a:r>
+              <a:rPr kumimoji="1" lang="en-US" altLang="ja-JP"/>
+              <a:t>4 </a:t>
+            </a:r>
+            <a:r>
+              <a:rPr kumimoji="1" lang="ja-JP" altLang="en-US"/>
+              <a:t>レベル</a:t>
             </a:r>
           </a:p>
           <a:p>
             <a:pPr lvl="4"/>
             <a:r>
-              <a:rPr lang="en-US" smtClean="0"/>
-              <a:t>Fifth level</a:t>
-            </a:r>
-            <a:endParaRPr lang="en-US"/>
-          </a:p>
-        </p:txBody>
-      </p:sp>
-      <p:sp>
-        <p:nvSpPr>
-          <p:cNvPr id="4" name="Text Placeholder 3"/>
+              <a:rPr kumimoji="1" lang="ja-JP" altLang="en-US"/>
+              <a:t>第 </a:t>
+            </a:r>
+            <a:r>
+              <a:rPr kumimoji="1" lang="en-US" altLang="ja-JP"/>
+              <a:t>5 </a:t>
+            </a:r>
+            <a:r>
+              <a:rPr kumimoji="1" lang="ja-JP" altLang="en-US"/>
+              <a:t>レベル</a:t>
+            </a:r>
+          </a:p>
+        </p:txBody>
+      </p:sp>
+      <p:sp>
+        <p:nvSpPr>
+          <p:cNvPr id="4" name="テキスト プレースホルダー 3">
+            <a:extLst>
+              <a:ext uri="{FF2B5EF4-FFF2-40B4-BE49-F238E27FC236}">
+                <a16:creationId xmlns:a16="http://schemas.microsoft.com/office/drawing/2014/main" id="{8CA6E331-2F28-3134-6A73-CD788C0A2B9D}"/>
+              </a:ext>
+            </a:extLst>
+          </p:cNvPr>
           <p:cNvSpPr>
             <a:spLocks noGrp="1"/>
           </p:cNvSpPr>
@@ -2557,8 +2928,8 @@
         </p:nvSpPr>
         <p:spPr>
           <a:xfrm>
-            <a:off x="457200" y="1435100"/>
-            <a:ext cx="3008313" cy="4691063"/>
+            <a:off x="839788" y="2057400"/>
+            <a:ext cx="3932237" cy="3811588"/>
           </a:xfrm>
         </p:spPr>
         <p:txBody>
@@ -2566,53 +2937,59 @@
           <a:lstStyle>
             <a:lvl1pPr marL="0" indent="0">
               <a:buNone/>
-              <a:defRPr sz="1400"/>
+              <a:defRPr sz="1600"/>
             </a:lvl1pPr>
             <a:lvl2pPr marL="457200" indent="0">
               <a:buNone/>
-              <a:defRPr sz="1200"/>
+              <a:defRPr sz="1400"/>
             </a:lvl2pPr>
             <a:lvl3pPr marL="914400" indent="0">
               <a:buNone/>
-              <a:defRPr sz="1000"/>
+              <a:defRPr sz="1200"/>
             </a:lvl3pPr>
             <a:lvl4pPr marL="1371600" indent="0">
               <a:buNone/>
-              <a:defRPr sz="900"/>
+              <a:defRPr sz="1000"/>
             </a:lvl4pPr>
             <a:lvl5pPr marL="1828800" indent="0">
               <a:buNone/>
-              <a:defRPr sz="900"/>
+              <a:defRPr sz="1000"/>
             </a:lvl5pPr>
             <a:lvl6pPr marL="2286000" indent="0">
               <a:buNone/>
-              <a:defRPr sz="900"/>
+              <a:defRPr sz="1000"/>
             </a:lvl6pPr>
             <a:lvl7pPr marL="2743200" indent="0">
               <a:buNone/>
-              <a:defRPr sz="900"/>
+              <a:defRPr sz="1000"/>
             </a:lvl7pPr>
             <a:lvl8pPr marL="3200400" indent="0">
               <a:buNone/>
-              <a:defRPr sz="900"/>
+              <a:defRPr sz="1000"/>
             </a:lvl8pPr>
             <a:lvl9pPr marL="3657600" indent="0">
               <a:buNone/>
-              <a:defRPr sz="900"/>
+              <a:defRPr sz="1000"/>
             </a:lvl9pPr>
           </a:lstStyle>
           <a:p>
             <a:pPr lvl="0"/>
             <a:r>
-              <a:rPr lang="en-US" smtClean="0"/>
-              <a:t>Click to edit Master text styles</a:t>
-            </a:r>
-          </a:p>
-        </p:txBody>
-      </p:sp>
-      <p:sp>
-        <p:nvSpPr>
-          <p:cNvPr id="5" name="Date Placeholder 4"/>
+              <a:rPr kumimoji="1" lang="ja-JP" altLang="en-US"/>
+              <a:t>マスター テキストの書式設定</a:t>
+            </a:r>
+          </a:p>
+        </p:txBody>
+      </p:sp>
+      <p:sp>
+        <p:nvSpPr>
+          <p:cNvPr id="5" name="日付プレースホルダー 4">
+            <a:extLst>
+              <a:ext uri="{FF2B5EF4-FFF2-40B4-BE49-F238E27FC236}">
+                <a16:creationId xmlns:a16="http://schemas.microsoft.com/office/drawing/2014/main" id="{D0890006-4606-D567-A03C-11C6DD8EDFA0}"/>
+              </a:ext>
+            </a:extLst>
+          </p:cNvPr>
           <p:cNvSpPr>
             <a:spLocks noGrp="1"/>
           </p:cNvSpPr>
@@ -2625,17 +3002,23 @@
           <a:bodyPr/>
           <a:lstStyle/>
           <a:p>
-            <a:fld id="{5BCAD085-E8A6-8845-BD4E-CB4CCA059FC4}" type="datetimeFigureOut">
-              <a:rPr lang="en-US" smtClean="0"/>
-              <a:t>1/27/13</a:t>
+            <a:fld id="{9436AD62-8BED-4F00-BDCC-CEAF4DF844F9}" type="datetimeFigureOut">
+              <a:rPr kumimoji="1" lang="ja-JP" altLang="en-US" smtClean="0"/>
+              <a:t>2025/5/12</a:t>
             </a:fld>
-            <a:endParaRPr lang="en-US"/>
-          </a:p>
-        </p:txBody>
-      </p:sp>
-      <p:sp>
-        <p:nvSpPr>
-          <p:cNvPr id="6" name="Footer Placeholder 5"/>
+            <a:endParaRPr kumimoji="1" lang="ja-JP" altLang="en-US"/>
+          </a:p>
+        </p:txBody>
+      </p:sp>
+      <p:sp>
+        <p:nvSpPr>
+          <p:cNvPr id="6" name="フッター プレースホルダー 5">
+            <a:extLst>
+              <a:ext uri="{FF2B5EF4-FFF2-40B4-BE49-F238E27FC236}">
+                <a16:creationId xmlns:a16="http://schemas.microsoft.com/office/drawing/2014/main" id="{4AC40B88-68F5-75DD-6F00-002A2D8B1741}"/>
+              </a:ext>
+            </a:extLst>
+          </p:cNvPr>
           <p:cNvSpPr>
             <a:spLocks noGrp="1"/>
           </p:cNvSpPr>
@@ -2648,13 +3031,19 @@
           <a:bodyPr/>
           <a:lstStyle/>
           <a:p>
-            <a:endParaRPr lang="en-US"/>
-          </a:p>
-        </p:txBody>
-      </p:sp>
-      <p:sp>
-        <p:nvSpPr>
-          <p:cNvPr id="7" name="Slide Number Placeholder 6"/>
+            <a:endParaRPr kumimoji="1" lang="ja-JP" altLang="en-US"/>
+          </a:p>
+        </p:txBody>
+      </p:sp>
+      <p:sp>
+        <p:nvSpPr>
+          <p:cNvPr id="7" name="スライド番号プレースホルダー 6">
+            <a:extLst>
+              <a:ext uri="{FF2B5EF4-FFF2-40B4-BE49-F238E27FC236}">
+                <a16:creationId xmlns:a16="http://schemas.microsoft.com/office/drawing/2014/main" id="{82C1766B-F39D-1D5C-229E-634B31F8B867}"/>
+              </a:ext>
+            </a:extLst>
+          </p:cNvPr>
           <p:cNvSpPr>
             <a:spLocks noGrp="1"/>
           </p:cNvSpPr>
@@ -2667,18 +3056,18 @@
           <a:bodyPr/>
           <a:lstStyle/>
           <a:p>
-            <a:fld id="{C1FF6DA9-008F-8B48-92A6-B652298478BF}" type="slidenum">
-              <a:rPr lang="en-US" smtClean="0"/>
+            <a:fld id="{9A7F45E2-1352-4454-84E4-E63636FB022F}" type="slidenum">
+              <a:rPr kumimoji="1" lang="ja-JP" altLang="en-US" smtClean="0"/>
               <a:t>‹#›</a:t>
             </a:fld>
-            <a:endParaRPr lang="en-US"/>
+            <a:endParaRPr kumimoji="1" lang="ja-JP" altLang="en-US"/>
           </a:p>
         </p:txBody>
       </p:sp>
     </p:spTree>
     <p:extLst>
       <p:ext uri="{BB962C8B-B14F-4D97-AF65-F5344CB8AC3E}">
-        <p14:creationId xmlns:p14="http://schemas.microsoft.com/office/powerpoint/2010/main" val="1840726560"/>
+        <p14:creationId xmlns:p14="http://schemas.microsoft.com/office/powerpoint/2010/main" val="583369460"/>
       </p:ext>
     </p:extLst>
   </p:cSld>
@@ -2690,7 +3079,7 @@
 
 <file path=ppt/slideLayouts/slideLayout9.xml><?xml version="1.0" encoding="utf-8"?>
 <p:sldLayout xmlns:a="http://schemas.openxmlformats.org/drawingml/2006/main" xmlns:r="http://schemas.openxmlformats.org/officeDocument/2006/relationships" xmlns:p="http://schemas.openxmlformats.org/presentationml/2006/main" type="picTx" preserve="1">
-  <p:cSld name="Picture with Caption">
+  <p:cSld name="タイトル付きの図">
     <p:spTree>
       <p:nvGrpSpPr>
         <p:cNvPr id="1" name=""/>
@@ -2707,7 +3096,13 @@
       </p:grpSpPr>
       <p:sp>
         <p:nvSpPr>
-          <p:cNvPr id="2" name="Title 1"/>
+          <p:cNvPr id="2" name="タイトル 1">
+            <a:extLst>
+              <a:ext uri="{FF2B5EF4-FFF2-40B4-BE49-F238E27FC236}">
+                <a16:creationId xmlns:a16="http://schemas.microsoft.com/office/drawing/2014/main" id="{14824519-AEC0-C48A-759E-B4C5B111AA9F}"/>
+              </a:ext>
+            </a:extLst>
+          </p:cNvPr>
           <p:cNvSpPr>
             <a:spLocks noGrp="1"/>
           </p:cNvSpPr>
@@ -2717,29 +3112,34 @@
         </p:nvSpPr>
         <p:spPr>
           <a:xfrm>
-            <a:off x="1792288" y="4800600"/>
-            <a:ext cx="5486400" cy="566738"/>
+            <a:off x="839788" y="457200"/>
+            <a:ext cx="3932237" cy="1600200"/>
           </a:xfrm>
         </p:spPr>
         <p:txBody>
           <a:bodyPr anchor="b"/>
           <a:lstStyle>
-            <a:lvl1pPr algn="l">
-              <a:defRPr sz="2000" b="1"/>
+            <a:lvl1pPr>
+              <a:defRPr sz="3200"/>
             </a:lvl1pPr>
           </a:lstStyle>
           <a:p>
             <a:r>
-              <a:rPr lang="en-US" smtClean="0"/>
-              <a:t>Click to edit Master title style</a:t>
-            </a:r>
-            <a:endParaRPr lang="en-US"/>
-          </a:p>
-        </p:txBody>
-      </p:sp>
-      <p:sp>
-        <p:nvSpPr>
-          <p:cNvPr id="3" name="Picture Placeholder 2"/>
+              <a:rPr kumimoji="1" lang="ja-JP" altLang="en-US"/>
+              <a:t>マスター タイトルの書式設定</a:t>
+            </a:r>
+          </a:p>
+        </p:txBody>
+      </p:sp>
+      <p:sp>
+        <p:nvSpPr>
+          <p:cNvPr id="3" name="図プレースホルダー 2">
+            <a:extLst>
+              <a:ext uri="{FF2B5EF4-FFF2-40B4-BE49-F238E27FC236}">
+                <a16:creationId xmlns:a16="http://schemas.microsoft.com/office/drawing/2014/main" id="{EBC82EAA-37DF-9A8E-35D8-5693D350CD34}"/>
+              </a:ext>
+            </a:extLst>
+          </p:cNvPr>
           <p:cNvSpPr>
             <a:spLocks noGrp="1"/>
           </p:cNvSpPr>
@@ -2749,8 +3149,8 @@
         </p:nvSpPr>
         <p:spPr>
           <a:xfrm>
-            <a:off x="1792288" y="612775"/>
-            <a:ext cx="5486400" cy="4114800"/>
+            <a:off x="5183188" y="987425"/>
+            <a:ext cx="6172200" cy="4873625"/>
           </a:xfrm>
         </p:spPr>
         <p:txBody>
@@ -2794,13 +3194,19 @@
             </a:lvl9pPr>
           </a:lstStyle>
           <a:p>
-            <a:endParaRPr lang="en-US"/>
-          </a:p>
-        </p:txBody>
-      </p:sp>
-      <p:sp>
-        <p:nvSpPr>
-          <p:cNvPr id="4" name="Text Placeholder 3"/>
+            <a:endParaRPr kumimoji="1" lang="ja-JP" altLang="en-US"/>
+          </a:p>
+        </p:txBody>
+      </p:sp>
+      <p:sp>
+        <p:nvSpPr>
+          <p:cNvPr id="4" name="テキスト プレースホルダー 3">
+            <a:extLst>
+              <a:ext uri="{FF2B5EF4-FFF2-40B4-BE49-F238E27FC236}">
+                <a16:creationId xmlns:a16="http://schemas.microsoft.com/office/drawing/2014/main" id="{344F8158-73B4-5DBD-5511-E60D6E55993E}"/>
+              </a:ext>
+            </a:extLst>
+          </p:cNvPr>
           <p:cNvSpPr>
             <a:spLocks noGrp="1"/>
           </p:cNvSpPr>
@@ -2810,8 +3216,8 @@
         </p:nvSpPr>
         <p:spPr>
           <a:xfrm>
-            <a:off x="1792288" y="5367338"/>
-            <a:ext cx="5486400" cy="804862"/>
+            <a:off x="839788" y="2057400"/>
+            <a:ext cx="3932237" cy="3811588"/>
           </a:xfrm>
         </p:spPr>
         <p:txBody>
@@ -2819,53 +3225,59 @@
           <a:lstStyle>
             <a:lvl1pPr marL="0" indent="0">
               <a:buNone/>
-              <a:defRPr sz="1400"/>
+              <a:defRPr sz="1600"/>
             </a:lvl1pPr>
             <a:lvl2pPr marL="457200" indent="0">
               <a:buNone/>
-              <a:defRPr sz="1200"/>
+              <a:defRPr sz="1400"/>
             </a:lvl2pPr>
             <a:lvl3pPr marL="914400" indent="0">
               <a:buNone/>
-              <a:defRPr sz="1000"/>
+              <a:defRPr sz="1200"/>
             </a:lvl3pPr>
             <a:lvl4pPr marL="1371600" indent="0">
               <a:buNone/>
-              <a:defRPr sz="900"/>
+              <a:defRPr sz="1000"/>
             </a:lvl4pPr>
             <a:lvl5pPr marL="1828800" indent="0">
               <a:buNone/>
-              <a:defRPr sz="900"/>
+              <a:defRPr sz="1000"/>
             </a:lvl5pPr>
             <a:lvl6pPr marL="2286000" indent="0">
               <a:buNone/>
-              <a:defRPr sz="900"/>
+              <a:defRPr sz="1000"/>
             </a:lvl6pPr>
             <a:lvl7pPr marL="2743200" indent="0">
               <a:buNone/>
-              <a:defRPr sz="900"/>
+              <a:defRPr sz="1000"/>
             </a:lvl7pPr>
             <a:lvl8pPr marL="3200400" indent="0">
               <a:buNone/>
-              <a:defRPr sz="900"/>
+              <a:defRPr sz="1000"/>
             </a:lvl8pPr>
             <a:lvl9pPr marL="3657600" indent="0">
               <a:buNone/>
-              <a:defRPr sz="900"/>
+              <a:defRPr sz="1000"/>
             </a:lvl9pPr>
           </a:lstStyle>
           <a:p>
             <a:pPr lvl="0"/>
             <a:r>
-              <a:rPr lang="en-US" smtClean="0"/>
-              <a:t>Click to edit Master text styles</a:t>
-            </a:r>
-          </a:p>
-        </p:txBody>
-      </p:sp>
-      <p:sp>
-        <p:nvSpPr>
-          <p:cNvPr id="5" name="Date Placeholder 4"/>
+              <a:rPr kumimoji="1" lang="ja-JP" altLang="en-US"/>
+              <a:t>マスター テキストの書式設定</a:t>
+            </a:r>
+          </a:p>
+        </p:txBody>
+      </p:sp>
+      <p:sp>
+        <p:nvSpPr>
+          <p:cNvPr id="5" name="日付プレースホルダー 4">
+            <a:extLst>
+              <a:ext uri="{FF2B5EF4-FFF2-40B4-BE49-F238E27FC236}">
+                <a16:creationId xmlns:a16="http://schemas.microsoft.com/office/drawing/2014/main" id="{07CF1131-A122-00E6-2DCF-9E2961263DE3}"/>
+              </a:ext>
+            </a:extLst>
+          </p:cNvPr>
           <p:cNvSpPr>
             <a:spLocks noGrp="1"/>
           </p:cNvSpPr>
@@ -2878,17 +3290,23 @@
           <a:bodyPr/>
           <a:lstStyle/>
           <a:p>
-            <a:fld id="{5BCAD085-E8A6-8845-BD4E-CB4CCA059FC4}" type="datetimeFigureOut">
-              <a:rPr lang="en-US" smtClean="0"/>
-              <a:t>1/27/13</a:t>
+            <a:fld id="{9436AD62-8BED-4F00-BDCC-CEAF4DF844F9}" type="datetimeFigureOut">
+              <a:rPr kumimoji="1" lang="ja-JP" altLang="en-US" smtClean="0"/>
+              <a:t>2025/5/12</a:t>
             </a:fld>
-            <a:endParaRPr lang="en-US"/>
-          </a:p>
-        </p:txBody>
-      </p:sp>
-      <p:sp>
-        <p:nvSpPr>
-          <p:cNvPr id="6" name="Footer Placeholder 5"/>
+            <a:endParaRPr kumimoji="1" lang="ja-JP" altLang="en-US"/>
+          </a:p>
+        </p:txBody>
+      </p:sp>
+      <p:sp>
+        <p:nvSpPr>
+          <p:cNvPr id="6" name="フッター プレースホルダー 5">
+            <a:extLst>
+              <a:ext uri="{FF2B5EF4-FFF2-40B4-BE49-F238E27FC236}">
+                <a16:creationId xmlns:a16="http://schemas.microsoft.com/office/drawing/2014/main" id="{1C220A72-D94D-6887-1744-E643D8A21363}"/>
+              </a:ext>
+            </a:extLst>
+          </p:cNvPr>
           <p:cNvSpPr>
             <a:spLocks noGrp="1"/>
           </p:cNvSpPr>
@@ -2901,13 +3319,19 @@
           <a:bodyPr/>
           <a:lstStyle/>
           <a:p>
-            <a:endParaRPr lang="en-US"/>
-          </a:p>
-        </p:txBody>
-      </p:sp>
-      <p:sp>
-        <p:nvSpPr>
-          <p:cNvPr id="7" name="Slide Number Placeholder 6"/>
+            <a:endParaRPr kumimoji="1" lang="ja-JP" altLang="en-US"/>
+          </a:p>
+        </p:txBody>
+      </p:sp>
+      <p:sp>
+        <p:nvSpPr>
+          <p:cNvPr id="7" name="スライド番号プレースホルダー 6">
+            <a:extLst>
+              <a:ext uri="{FF2B5EF4-FFF2-40B4-BE49-F238E27FC236}">
+                <a16:creationId xmlns:a16="http://schemas.microsoft.com/office/drawing/2014/main" id="{14D87B11-38C5-18C3-6807-0C7FFB1B1C79}"/>
+              </a:ext>
+            </a:extLst>
+          </p:cNvPr>
           <p:cNvSpPr>
             <a:spLocks noGrp="1"/>
           </p:cNvSpPr>
@@ -2920,18 +3344,18 @@
           <a:bodyPr/>
           <a:lstStyle/>
           <a:p>
-            <a:fld id="{C1FF6DA9-008F-8B48-92A6-B652298478BF}" type="slidenum">
-              <a:rPr lang="en-US" smtClean="0"/>
+            <a:fld id="{9A7F45E2-1352-4454-84E4-E63636FB022F}" type="slidenum">
+              <a:rPr kumimoji="1" lang="ja-JP" altLang="en-US" smtClean="0"/>
               <a:t>‹#›</a:t>
             </a:fld>
-            <a:endParaRPr lang="en-US"/>
+            <a:endParaRPr kumimoji="1" lang="ja-JP" altLang="en-US"/>
           </a:p>
         </p:txBody>
       </p:sp>
     </p:spTree>
     <p:extLst>
       <p:ext uri="{BB962C8B-B14F-4D97-AF65-F5344CB8AC3E}">
-        <p14:creationId xmlns:p14="http://schemas.microsoft.com/office/powerpoint/2010/main" val="3889236939"/>
+        <p14:creationId xmlns:p14="http://schemas.microsoft.com/office/powerpoint/2010/main" val="1660634917"/>
       </p:ext>
     </p:extLst>
   </p:cSld>
@@ -2965,7 +3389,13 @@
       </p:grpSpPr>
       <p:sp>
         <p:nvSpPr>
-          <p:cNvPr id="2" name="Title Placeholder 1"/>
+          <p:cNvPr id="2" name="タイトル プレースホルダー 1">
+            <a:extLst>
+              <a:ext uri="{FF2B5EF4-FFF2-40B4-BE49-F238E27FC236}">
+                <a16:creationId xmlns:a16="http://schemas.microsoft.com/office/drawing/2014/main" id="{6E411AE8-FA83-83FC-B2A2-26D53D6305C4}"/>
+              </a:ext>
+            </a:extLst>
+          </p:cNvPr>
           <p:cNvSpPr>
             <a:spLocks noGrp="1"/>
           </p:cNvSpPr>
@@ -2975,8 +3405,8 @@
         </p:nvSpPr>
         <p:spPr>
           <a:xfrm>
-            <a:off x="457200" y="274638"/>
-            <a:ext cx="8229600" cy="1143000"/>
+            <a:off x="838200" y="365125"/>
+            <a:ext cx="10515600" cy="1325563"/>
           </a:xfrm>
           <a:prstGeom prst="rect">
             <a:avLst/>
@@ -2989,16 +3419,21 @@
           <a:lstStyle/>
           <a:p>
             <a:r>
-              <a:rPr lang="en-US" smtClean="0"/>
-              <a:t>Click to edit Master title style</a:t>
-            </a:r>
-            <a:endParaRPr lang="en-US"/>
-          </a:p>
-        </p:txBody>
-      </p:sp>
-      <p:sp>
-        <p:nvSpPr>
-          <p:cNvPr id="3" name="Text Placeholder 2"/>
+              <a:rPr kumimoji="1" lang="ja-JP" altLang="en-US"/>
+              <a:t>マスター タイトルの書式設定</a:t>
+            </a:r>
+          </a:p>
+        </p:txBody>
+      </p:sp>
+      <p:sp>
+        <p:nvSpPr>
+          <p:cNvPr id="3" name="テキスト プレースホルダー 2">
+            <a:extLst>
+              <a:ext uri="{FF2B5EF4-FFF2-40B4-BE49-F238E27FC236}">
+                <a16:creationId xmlns:a16="http://schemas.microsoft.com/office/drawing/2014/main" id="{9845C196-FB90-EC60-4632-E9F38D9AEDE7}"/>
+              </a:ext>
+            </a:extLst>
+          </p:cNvPr>
           <p:cNvSpPr>
             <a:spLocks noGrp="1"/>
           </p:cNvSpPr>
@@ -3008,8 +3443,8 @@
         </p:nvSpPr>
         <p:spPr>
           <a:xfrm>
-            <a:off x="457200" y="1600200"/>
-            <a:ext cx="8229600" cy="4525963"/>
+            <a:off x="838200" y="1825625"/>
+            <a:ext cx="10515600" cy="4351338"/>
           </a:xfrm>
           <a:prstGeom prst="rect">
             <a:avLst/>
@@ -3023,44 +3458,81 @@
           <a:p>
             <a:pPr lvl="0"/>
             <a:r>
-              <a:rPr lang="en-US" smtClean="0"/>
-              <a:t>Click to edit Master text styles</a:t>
+              <a:rPr kumimoji="1" lang="ja-JP" altLang="en-US"/>
+              <a:t>マスター テキストの書式設定</a:t>
             </a:r>
           </a:p>
           <a:p>
             <a:pPr lvl="1"/>
             <a:r>
-              <a:rPr lang="en-US" smtClean="0"/>
-              <a:t>Second level</a:t>
+              <a:rPr kumimoji="1" lang="ja-JP" altLang="en-US"/>
+              <a:t>第 </a:t>
+            </a:r>
+            <a:r>
+              <a:rPr kumimoji="1" lang="en-US" altLang="ja-JP"/>
+              <a:t>2 </a:t>
+            </a:r>
+            <a:r>
+              <a:rPr kumimoji="1" lang="ja-JP" altLang="en-US"/>
+              <a:t>レベル</a:t>
             </a:r>
           </a:p>
           <a:p>
             <a:pPr lvl="2"/>
             <a:r>
-              <a:rPr lang="en-US" smtClean="0"/>
-              <a:t>Third level</a:t>
+              <a:rPr kumimoji="1" lang="ja-JP" altLang="en-US"/>
+              <a:t>第 </a:t>
+            </a:r>
+            <a:r>
+              <a:rPr kumimoji="1" lang="en-US" altLang="ja-JP"/>
+              <a:t>3 </a:t>
+            </a:r>
+            <a:r>
+              <a:rPr kumimoji="1" lang="ja-JP" altLang="en-US"/>
+              <a:t>レベル</a:t>
             </a:r>
           </a:p>
           <a:p>
             <a:pPr lvl="3"/>
             <a:r>
-              <a:rPr lang="en-US" smtClean="0"/>
-              <a:t>Fourth level</a:t>
+              <a:rPr kumimoji="1" lang="ja-JP" altLang="en-US"/>
+              <a:t>第 </a:t>
+            </a:r>
+            <a:r>
+              <a:rPr kumimoji="1" lang="en-US" altLang="ja-JP"/>
+              <a:t>4 </a:t>
+            </a:r>
+            <a:r>
+              <a:rPr kumimoji="1" lang="ja-JP" altLang="en-US"/>
+              <a:t>レベル</a:t>
             </a:r>
           </a:p>
           <a:p>
             <a:pPr lvl="4"/>
             <a:r>
-              <a:rPr lang="en-US" smtClean="0"/>
-              <a:t>Fifth level</a:t>
-            </a:r>
-            <a:endParaRPr lang="en-US"/>
-          </a:p>
-        </p:txBody>
-      </p:sp>
-      <p:sp>
-        <p:nvSpPr>
-          <p:cNvPr id="4" name="Date Placeholder 3"/>
+              <a:rPr kumimoji="1" lang="ja-JP" altLang="en-US"/>
+              <a:t>第 </a:t>
+            </a:r>
+            <a:r>
+              <a:rPr kumimoji="1" lang="en-US" altLang="ja-JP"/>
+              <a:t>5 </a:t>
+            </a:r>
+            <a:r>
+              <a:rPr kumimoji="1" lang="ja-JP" altLang="en-US"/>
+              <a:t>レベル</a:t>
+            </a:r>
+          </a:p>
+        </p:txBody>
+      </p:sp>
+      <p:sp>
+        <p:nvSpPr>
+          <p:cNvPr id="4" name="日付プレースホルダー 3">
+            <a:extLst>
+              <a:ext uri="{FF2B5EF4-FFF2-40B4-BE49-F238E27FC236}">
+                <a16:creationId xmlns:a16="http://schemas.microsoft.com/office/drawing/2014/main" id="{CDB0DC21-92C9-1504-823A-33AC4F8854E2}"/>
+              </a:ext>
+            </a:extLst>
+          </p:cNvPr>
           <p:cNvSpPr>
             <a:spLocks noGrp="1"/>
           </p:cNvSpPr>
@@ -3070,8 +3542,8 @@
         </p:nvSpPr>
         <p:spPr>
           <a:xfrm>
-            <a:off x="457200" y="6356350"/>
-            <a:ext cx="2133600" cy="365125"/>
+            <a:off x="838200" y="6356350"/>
+            <a:ext cx="2743200" cy="365125"/>
           </a:xfrm>
           <a:prstGeom prst="rect">
             <a:avLst/>
@@ -3084,24 +3556,30 @@
               <a:defRPr sz="1200">
                 <a:solidFill>
                   <a:schemeClr val="tx1">
-                    <a:tint val="75000"/>
+                    <a:tint val="82000"/>
                   </a:schemeClr>
                 </a:solidFill>
               </a:defRPr>
             </a:lvl1pPr>
           </a:lstStyle>
           <a:p>
-            <a:fld id="{5BCAD085-E8A6-8845-BD4E-CB4CCA059FC4}" type="datetimeFigureOut">
-              <a:rPr lang="en-US" smtClean="0"/>
-              <a:t>1/27/13</a:t>
+            <a:fld id="{9436AD62-8BED-4F00-BDCC-CEAF4DF844F9}" type="datetimeFigureOut">
+              <a:rPr kumimoji="1" lang="ja-JP" altLang="en-US" smtClean="0"/>
+              <a:t>2025/5/12</a:t>
             </a:fld>
-            <a:endParaRPr lang="en-US"/>
-          </a:p>
-        </p:txBody>
-      </p:sp>
-      <p:sp>
-        <p:nvSpPr>
-          <p:cNvPr id="5" name="Footer Placeholder 4"/>
+            <a:endParaRPr kumimoji="1" lang="ja-JP" altLang="en-US"/>
+          </a:p>
+        </p:txBody>
+      </p:sp>
+      <p:sp>
+        <p:nvSpPr>
+          <p:cNvPr id="5" name="フッター プレースホルダー 4">
+            <a:extLst>
+              <a:ext uri="{FF2B5EF4-FFF2-40B4-BE49-F238E27FC236}">
+                <a16:creationId xmlns:a16="http://schemas.microsoft.com/office/drawing/2014/main" id="{65194FEF-0298-2EA4-83D2-B1AB50901C7C}"/>
+              </a:ext>
+            </a:extLst>
+          </p:cNvPr>
           <p:cNvSpPr>
             <a:spLocks noGrp="1"/>
           </p:cNvSpPr>
@@ -3111,8 +3589,8 @@
         </p:nvSpPr>
         <p:spPr>
           <a:xfrm>
-            <a:off x="3124200" y="6356350"/>
-            <a:ext cx="2895600" cy="365125"/>
+            <a:off x="4038600" y="6356350"/>
+            <a:ext cx="4114800" cy="365125"/>
           </a:xfrm>
           <a:prstGeom prst="rect">
             <a:avLst/>
@@ -3125,20 +3603,26 @@
               <a:defRPr sz="1200">
                 <a:solidFill>
                   <a:schemeClr val="tx1">
-                    <a:tint val="75000"/>
+                    <a:tint val="82000"/>
                   </a:schemeClr>
                 </a:solidFill>
               </a:defRPr>
             </a:lvl1pPr>
           </a:lstStyle>
           <a:p>
-            <a:endParaRPr lang="en-US"/>
-          </a:p>
-        </p:txBody>
-      </p:sp>
-      <p:sp>
-        <p:nvSpPr>
-          <p:cNvPr id="6" name="Slide Number Placeholder 5"/>
+            <a:endParaRPr kumimoji="1" lang="ja-JP" altLang="en-US"/>
+          </a:p>
+        </p:txBody>
+      </p:sp>
+      <p:sp>
+        <p:nvSpPr>
+          <p:cNvPr id="6" name="スライド番号プレースホルダー 5">
+            <a:extLst>
+              <a:ext uri="{FF2B5EF4-FFF2-40B4-BE49-F238E27FC236}">
+                <a16:creationId xmlns:a16="http://schemas.microsoft.com/office/drawing/2014/main" id="{C22B4436-94A0-E09E-ADF0-05E31A31DBB8}"/>
+              </a:ext>
+            </a:extLst>
+          </p:cNvPr>
           <p:cNvSpPr>
             <a:spLocks noGrp="1"/>
           </p:cNvSpPr>
@@ -3148,8 +3632,8 @@
         </p:nvSpPr>
         <p:spPr>
           <a:xfrm>
-            <a:off x="6553200" y="6356350"/>
-            <a:ext cx="2133600" cy="365125"/>
+            <a:off x="8610600" y="6356350"/>
+            <a:ext cx="2743200" cy="365125"/>
           </a:xfrm>
           <a:prstGeom prst="rect">
             <a:avLst/>
@@ -3162,25 +3646,25 @@
               <a:defRPr sz="1200">
                 <a:solidFill>
                   <a:schemeClr val="tx1">
-                    <a:tint val="75000"/>
+                    <a:tint val="82000"/>
                   </a:schemeClr>
                 </a:solidFill>
               </a:defRPr>
             </a:lvl1pPr>
           </a:lstStyle>
           <a:p>
-            <a:fld id="{C1FF6DA9-008F-8B48-92A6-B652298478BF}" type="slidenum">
-              <a:rPr lang="en-US" smtClean="0"/>
+            <a:fld id="{9A7F45E2-1352-4454-84E4-E63636FB022F}" type="slidenum">
+              <a:rPr kumimoji="1" lang="ja-JP" altLang="en-US" smtClean="0"/>
               <a:t>‹#›</a:t>
             </a:fld>
-            <a:endParaRPr lang="en-US"/>
+            <a:endParaRPr kumimoji="1" lang="ja-JP" altLang="en-US"/>
           </a:p>
         </p:txBody>
       </p:sp>
     </p:spTree>
     <p:extLst>
       <p:ext uri="{BB962C8B-B14F-4D97-AF65-F5344CB8AC3E}">
-        <p14:creationId xmlns:p14="http://schemas.microsoft.com/office/powerpoint/2010/main" val="2209977519"/>
+        <p14:creationId xmlns:p14="http://schemas.microsoft.com/office/powerpoint/2010/main" val="2057898446"/>
       </p:ext>
     </p:extLst>
   </p:cSld>
@@ -3200,12 +3684,15 @@
   </p:sldLayoutIdLst>
   <p:txStyles>
     <p:titleStyle>
-      <a:lvl1pPr algn="ctr" defTabSz="457200" rtl="0" eaLnBrk="1" latinLnBrk="0" hangingPunct="1">
+      <a:lvl1pPr algn="l" defTabSz="914400" rtl="0" eaLnBrk="1" latinLnBrk="0" hangingPunct="1">
+        <a:lnSpc>
+          <a:spcPct val="90000"/>
+        </a:lnSpc>
         <a:spcBef>
           <a:spcPct val="0"/>
         </a:spcBef>
         <a:buNone/>
-        <a:defRPr sz="4400" kern="1200">
+        <a:defRPr kumimoji="1" sz="4400" kern="1200">
           <a:solidFill>
             <a:schemeClr val="tx1"/>
           </a:solidFill>
@@ -3216,13 +3703,16 @@
       </a:lvl1pPr>
     </p:titleStyle>
     <p:bodyStyle>
-      <a:lvl1pPr marL="342900" indent="-342900" algn="l" defTabSz="457200" rtl="0" eaLnBrk="1" latinLnBrk="0" hangingPunct="1">
+      <a:lvl1pPr marL="228600" indent="-228600" algn="l" defTabSz="914400" rtl="0" eaLnBrk="1" latinLnBrk="0" hangingPunct="1">
+        <a:lnSpc>
+          <a:spcPct val="90000"/>
+        </a:lnSpc>
         <a:spcBef>
-          <a:spcPct val="20000"/>
+          <a:spcPts val="1000"/>
         </a:spcBef>
-        <a:buFont typeface="Arial"/>
+        <a:buFont typeface="Arial" panose="020B0604020202020204" pitchFamily="34" charset="0"/>
         <a:buChar char="•"/>
-        <a:defRPr sz="3200" kern="1200">
+        <a:defRPr kumimoji="1" sz="2800" kern="1200">
           <a:solidFill>
             <a:schemeClr val="tx1"/>
           </a:solidFill>
@@ -3231,13 +3721,16 @@
           <a:cs typeface="+mn-cs"/>
         </a:defRPr>
       </a:lvl1pPr>
-      <a:lvl2pPr marL="742950" indent="-285750" algn="l" defTabSz="457200" rtl="0" eaLnBrk="1" latinLnBrk="0" hangingPunct="1">
+      <a:lvl2pPr marL="685800" indent="-228600" algn="l" defTabSz="914400" rtl="0" eaLnBrk="1" latinLnBrk="0" hangingPunct="1">
+        <a:lnSpc>
+          <a:spcPct val="90000"/>
+        </a:lnSpc>
         <a:spcBef>
-          <a:spcPct val="20000"/>
+          <a:spcPts val="500"/>
         </a:spcBef>
-        <a:buFont typeface="Arial"/>
-        <a:buChar char="–"/>
-        <a:defRPr sz="2800" kern="1200">
+        <a:buFont typeface="Arial" panose="020B0604020202020204" pitchFamily="34" charset="0"/>
+        <a:buChar char="•"/>
+        <a:defRPr kumimoji="1" sz="2400" kern="1200">
           <a:solidFill>
             <a:schemeClr val="tx1"/>
           </a:solidFill>
@@ -3246,13 +3739,16 @@
           <a:cs typeface="+mn-cs"/>
         </a:defRPr>
       </a:lvl2pPr>
-      <a:lvl3pPr marL="1143000" indent="-228600" algn="l" defTabSz="457200" rtl="0" eaLnBrk="1" latinLnBrk="0" hangingPunct="1">
+      <a:lvl3pPr marL="1143000" indent="-228600" algn="l" defTabSz="914400" rtl="0" eaLnBrk="1" latinLnBrk="0" hangingPunct="1">
+        <a:lnSpc>
+          <a:spcPct val="90000"/>
+        </a:lnSpc>
         <a:spcBef>
-          <a:spcPct val="20000"/>
+          <a:spcPts val="500"/>
         </a:spcBef>
-        <a:buFont typeface="Arial"/>
+        <a:buFont typeface="Arial" panose="020B0604020202020204" pitchFamily="34" charset="0"/>
         <a:buChar char="•"/>
-        <a:defRPr sz="2400" kern="1200">
+        <a:defRPr kumimoji="1" sz="2000" kern="1200">
           <a:solidFill>
             <a:schemeClr val="tx1"/>
           </a:solidFill>
@@ -3261,13 +3757,16 @@
           <a:cs typeface="+mn-cs"/>
         </a:defRPr>
       </a:lvl3pPr>
-      <a:lvl4pPr marL="1600200" indent="-228600" algn="l" defTabSz="457200" rtl="0" eaLnBrk="1" latinLnBrk="0" hangingPunct="1">
+      <a:lvl4pPr marL="1600200" indent="-228600" algn="l" defTabSz="914400" rtl="0" eaLnBrk="1" latinLnBrk="0" hangingPunct="1">
+        <a:lnSpc>
+          <a:spcPct val="90000"/>
+        </a:lnSpc>
         <a:spcBef>
-          <a:spcPct val="20000"/>
+          <a:spcPts val="500"/>
         </a:spcBef>
-        <a:buFont typeface="Arial"/>
-        <a:buChar char="–"/>
-        <a:defRPr sz="2000" kern="1200">
+        <a:buFont typeface="Arial" panose="020B0604020202020204" pitchFamily="34" charset="0"/>
+        <a:buChar char="•"/>
+        <a:defRPr kumimoji="1" sz="1800" kern="1200">
           <a:solidFill>
             <a:schemeClr val="tx1"/>
           </a:solidFill>
@@ -3276,13 +3775,16 @@
           <a:cs typeface="+mn-cs"/>
         </a:defRPr>
       </a:lvl4pPr>
-      <a:lvl5pPr marL="2057400" indent="-228600" algn="l" defTabSz="457200" rtl="0" eaLnBrk="1" latinLnBrk="0" hangingPunct="1">
+      <a:lvl5pPr marL="2057400" indent="-228600" algn="l" defTabSz="914400" rtl="0" eaLnBrk="1" latinLnBrk="0" hangingPunct="1">
+        <a:lnSpc>
+          <a:spcPct val="90000"/>
+        </a:lnSpc>
         <a:spcBef>
-          <a:spcPct val="20000"/>
+          <a:spcPts val="500"/>
         </a:spcBef>
-        <a:buFont typeface="Arial"/>
-        <a:buChar char="»"/>
-        <a:defRPr sz="2000" kern="1200">
+        <a:buFont typeface="Arial" panose="020B0604020202020204" pitchFamily="34" charset="0"/>
+        <a:buChar char="•"/>
+        <a:defRPr kumimoji="1" sz="1800" kern="1200">
           <a:solidFill>
             <a:schemeClr val="tx1"/>
           </a:solidFill>
@@ -3291,13 +3793,16 @@
           <a:cs typeface="+mn-cs"/>
         </a:defRPr>
       </a:lvl5pPr>
-      <a:lvl6pPr marL="2514600" indent="-228600" algn="l" defTabSz="457200" rtl="0" eaLnBrk="1" latinLnBrk="0" hangingPunct="1">
+      <a:lvl6pPr marL="2514600" indent="-228600" algn="l" defTabSz="914400" rtl="0" eaLnBrk="1" latinLnBrk="0" hangingPunct="1">
+        <a:lnSpc>
+          <a:spcPct val="90000"/>
+        </a:lnSpc>
         <a:spcBef>
-          <a:spcPct val="20000"/>
+          <a:spcPts val="500"/>
         </a:spcBef>
-        <a:buFont typeface="Arial"/>
+        <a:buFont typeface="Arial" panose="020B0604020202020204" pitchFamily="34" charset="0"/>
         <a:buChar char="•"/>
-        <a:defRPr sz="2000" kern="1200">
+        <a:defRPr kumimoji="1" sz="1800" kern="1200">
           <a:solidFill>
             <a:schemeClr val="tx1"/>
           </a:solidFill>
@@ -3306,13 +3811,16 @@
           <a:cs typeface="+mn-cs"/>
         </a:defRPr>
       </a:lvl6pPr>
-      <a:lvl7pPr marL="2971800" indent="-228600" algn="l" defTabSz="457200" rtl="0" eaLnBrk="1" latinLnBrk="0" hangingPunct="1">
+      <a:lvl7pPr marL="2971800" indent="-228600" algn="l" defTabSz="914400" rtl="0" eaLnBrk="1" latinLnBrk="0" hangingPunct="1">
+        <a:lnSpc>
+          <a:spcPct val="90000"/>
+        </a:lnSpc>
         <a:spcBef>
-          <a:spcPct val="20000"/>
+          <a:spcPts val="500"/>
         </a:spcBef>
-        <a:buFont typeface="Arial"/>
+        <a:buFont typeface="Arial" panose="020B0604020202020204" pitchFamily="34" charset="0"/>
         <a:buChar char="•"/>
-        <a:defRPr sz="2000" kern="1200">
+        <a:defRPr kumimoji="1" sz="1800" kern="1200">
           <a:solidFill>
             <a:schemeClr val="tx1"/>
           </a:solidFill>
@@ -3321,13 +3829,16 @@
           <a:cs typeface="+mn-cs"/>
         </a:defRPr>
       </a:lvl7pPr>
-      <a:lvl8pPr marL="3429000" indent="-228600" algn="l" defTabSz="457200" rtl="0" eaLnBrk="1" latinLnBrk="0" hangingPunct="1">
+      <a:lvl8pPr marL="3429000" indent="-228600" algn="l" defTabSz="914400" rtl="0" eaLnBrk="1" latinLnBrk="0" hangingPunct="1">
+        <a:lnSpc>
+          <a:spcPct val="90000"/>
+        </a:lnSpc>
         <a:spcBef>
-          <a:spcPct val="20000"/>
+          <a:spcPts val="500"/>
         </a:spcBef>
-        <a:buFont typeface="Arial"/>
+        <a:buFont typeface="Arial" panose="020B0604020202020204" pitchFamily="34" charset="0"/>
         <a:buChar char="•"/>
-        <a:defRPr sz="2000" kern="1200">
+        <a:defRPr kumimoji="1" sz="1800" kern="1200">
           <a:solidFill>
             <a:schemeClr val="tx1"/>
           </a:solidFill>
@@ -3336,13 +3847,16 @@
           <a:cs typeface="+mn-cs"/>
         </a:defRPr>
       </a:lvl8pPr>
-      <a:lvl9pPr marL="3886200" indent="-228600" algn="l" defTabSz="457200" rtl="0" eaLnBrk="1" latinLnBrk="0" hangingPunct="1">
+      <a:lvl9pPr marL="3886200" indent="-228600" algn="l" defTabSz="914400" rtl="0" eaLnBrk="1" latinLnBrk="0" hangingPunct="1">
+        <a:lnSpc>
+          <a:spcPct val="90000"/>
+        </a:lnSpc>
         <a:spcBef>
-          <a:spcPct val="20000"/>
+          <a:spcPts val="500"/>
         </a:spcBef>
-        <a:buFont typeface="Arial"/>
+        <a:buFont typeface="Arial" panose="020B0604020202020204" pitchFamily="34" charset="0"/>
         <a:buChar char="•"/>
-        <a:defRPr sz="2000" kern="1200">
+        <a:defRPr kumimoji="1" sz="1800" kern="1200">
           <a:solidFill>
             <a:schemeClr val="tx1"/>
           </a:solidFill>
@@ -3354,10 +3868,10 @@
     </p:bodyStyle>
     <p:otherStyle>
       <a:defPPr>
-        <a:defRPr lang="en-US"/>
+        <a:defRPr lang="ja-JP"/>
       </a:defPPr>
-      <a:lvl1pPr marL="0" algn="l" defTabSz="457200" rtl="0" eaLnBrk="1" latinLnBrk="0" hangingPunct="1">
-        <a:defRPr sz="1800" kern="1200">
+      <a:lvl1pPr marL="0" algn="l" defTabSz="914400" rtl="0" eaLnBrk="1" latinLnBrk="0" hangingPunct="1">
+        <a:defRPr kumimoji="1" sz="1800" kern="1200">
           <a:solidFill>
             <a:schemeClr val="tx1"/>
           </a:solidFill>
@@ -3366,8 +3880,8 @@
           <a:cs typeface="+mn-cs"/>
         </a:defRPr>
       </a:lvl1pPr>
-      <a:lvl2pPr marL="457200" algn="l" defTabSz="457200" rtl="0" eaLnBrk="1" latinLnBrk="0" hangingPunct="1">
-        <a:defRPr sz="1800" kern="1200">
+      <a:lvl2pPr marL="457200" algn="l" defTabSz="914400" rtl="0" eaLnBrk="1" latinLnBrk="0" hangingPunct="1">
+        <a:defRPr kumimoji="1" sz="1800" kern="1200">
           <a:solidFill>
             <a:schemeClr val="tx1"/>
           </a:solidFill>
@@ -3376,8 +3890,8 @@
           <a:cs typeface="+mn-cs"/>
         </a:defRPr>
       </a:lvl2pPr>
-      <a:lvl3pPr marL="914400" algn="l" defTabSz="457200" rtl="0" eaLnBrk="1" latinLnBrk="0" hangingPunct="1">
-        <a:defRPr sz="1800" kern="1200">
+      <a:lvl3pPr marL="914400" algn="l" defTabSz="914400" rtl="0" eaLnBrk="1" latinLnBrk="0" hangingPunct="1">
+        <a:defRPr kumimoji="1" sz="1800" kern="1200">
           <a:solidFill>
             <a:schemeClr val="tx1"/>
           </a:solidFill>
@@ -3386,8 +3900,8 @@
           <a:cs typeface="+mn-cs"/>
         </a:defRPr>
       </a:lvl3pPr>
-      <a:lvl4pPr marL="1371600" algn="l" defTabSz="457200" rtl="0" eaLnBrk="1" latinLnBrk="0" hangingPunct="1">
-        <a:defRPr sz="1800" kern="1200">
+      <a:lvl4pPr marL="1371600" algn="l" defTabSz="914400" rtl="0" eaLnBrk="1" latinLnBrk="0" hangingPunct="1">
+        <a:defRPr kumimoji="1" sz="1800" kern="1200">
           <a:solidFill>
             <a:schemeClr val="tx1"/>
           </a:solidFill>
@@ -3396,8 +3910,8 @@
           <a:cs typeface="+mn-cs"/>
         </a:defRPr>
       </a:lvl4pPr>
-      <a:lvl5pPr marL="1828800" algn="l" defTabSz="457200" rtl="0" eaLnBrk="1" latinLnBrk="0" hangingPunct="1">
-        <a:defRPr sz="1800" kern="1200">
+      <a:lvl5pPr marL="1828800" algn="l" defTabSz="914400" rtl="0" eaLnBrk="1" latinLnBrk="0" hangingPunct="1">
+        <a:defRPr kumimoji="1" sz="1800" kern="1200">
           <a:solidFill>
             <a:schemeClr val="tx1"/>
           </a:solidFill>
@@ -3406,8 +3920,8 @@
           <a:cs typeface="+mn-cs"/>
         </a:defRPr>
       </a:lvl5pPr>
-      <a:lvl6pPr marL="2286000" algn="l" defTabSz="457200" rtl="0" eaLnBrk="1" latinLnBrk="0" hangingPunct="1">
-        <a:defRPr sz="1800" kern="1200">
+      <a:lvl6pPr marL="2286000" algn="l" defTabSz="914400" rtl="0" eaLnBrk="1" latinLnBrk="0" hangingPunct="1">
+        <a:defRPr kumimoji="1" sz="1800" kern="1200">
           <a:solidFill>
             <a:schemeClr val="tx1"/>
           </a:solidFill>
@@ -3416,8 +3930,8 @@
           <a:cs typeface="+mn-cs"/>
         </a:defRPr>
       </a:lvl6pPr>
-      <a:lvl7pPr marL="2743200" algn="l" defTabSz="457200" rtl="0" eaLnBrk="1" latinLnBrk="0" hangingPunct="1">
-        <a:defRPr sz="1800" kern="1200">
+      <a:lvl7pPr marL="2743200" algn="l" defTabSz="914400" rtl="0" eaLnBrk="1" latinLnBrk="0" hangingPunct="1">
+        <a:defRPr kumimoji="1" sz="1800" kern="1200">
           <a:solidFill>
             <a:schemeClr val="tx1"/>
           </a:solidFill>
@@ -3426,8 +3940,8 @@
           <a:cs typeface="+mn-cs"/>
         </a:defRPr>
       </a:lvl7pPr>
-      <a:lvl8pPr marL="3200400" algn="l" defTabSz="457200" rtl="0" eaLnBrk="1" latinLnBrk="0" hangingPunct="1">
-        <a:defRPr sz="1800" kern="1200">
+      <a:lvl8pPr marL="3200400" algn="l" defTabSz="914400" rtl="0" eaLnBrk="1" latinLnBrk="0" hangingPunct="1">
+        <a:defRPr kumimoji="1" sz="1800" kern="1200">
           <a:solidFill>
             <a:schemeClr val="tx1"/>
           </a:solidFill>
@@ -3436,8 +3950,8 @@
           <a:cs typeface="+mn-cs"/>
         </a:defRPr>
       </a:lvl8pPr>
-      <a:lvl9pPr marL="3657600" algn="l" defTabSz="457200" rtl="0" eaLnBrk="1" latinLnBrk="0" hangingPunct="1">
-        <a:defRPr sz="1800" kern="1200">
+      <a:lvl9pPr marL="3657600" algn="l" defTabSz="914400" rtl="0" eaLnBrk="1" latinLnBrk="0" hangingPunct="1">
+        <a:defRPr kumimoji="1" sz="1800" kern="1200">
           <a:solidFill>
             <a:schemeClr val="tx1"/>
           </a:solidFill>
@@ -3469,7 +3983,7 @@
         </p:nvSpPr>
         <p:spPr>
           <a:xfrm>
-            <a:off x="4000500" y="2057400"/>
+            <a:off x="4572000" y="2057400"/>
             <a:ext cx="7315200" cy="1028700"/>
           </a:xfrm>
           <a:prstGeom prst="rect">
@@ -3502,7 +4016,7 @@
         </p:nvSpPr>
         <p:spPr>
           <a:xfrm>
-            <a:off x="4000500" y="3429000"/>
+            <a:off x="4572000" y="3429000"/>
             <a:ext cx="5486400" cy="685800"/>
           </a:xfrm>
           <a:prstGeom prst="rect">
@@ -3553,8 +4067,8 @@
         </p:nvSpPr>
         <p:spPr>
           <a:xfrm>
-            <a:off x="4000500" y="685800"/>
-            <a:ext cx="7315200" cy="1028700"/>
+            <a:off x="0" y="685800"/>
+            <a:ext cx="9144000" cy="1028700"/>
           </a:xfrm>
           <a:prstGeom prst="rect">
             <a:avLst/>
@@ -3573,7 +4087,7 @@
               </a:defRPr>
             </a:pPr>
             <a:r>
-              <a:t>Text Formatting</a:t>
+              <a:t>Text;lksdja;sd</a:t>
             </a:r>
           </a:p>
         </p:txBody>
@@ -3772,7 +4286,7 @@
         </p:nvSpPr>
         <p:spPr>
           <a:xfrm>
-            <a:off x="4000500" y="685800"/>
+            <a:off x="4572000" y="685800"/>
             <a:ext cx="7315200" cy="1028700"/>
           </a:xfrm>
           <a:prstGeom prst="rect">
@@ -4115,7 +4629,7 @@
         </p:nvSpPr>
         <p:spPr>
           <a:xfrm>
-            <a:off x="4000500" y="685800"/>
+            <a:off x="4572000" y="685800"/>
             <a:ext cx="7315200" cy="1028700"/>
           </a:xfrm>
           <a:prstGeom prst="rect">
@@ -4202,7 +4716,7 @@
         </p:nvSpPr>
         <p:spPr>
           <a:xfrm>
-            <a:off x="4000500" y="685800"/>
+            <a:off x="4572000" y="685800"/>
             <a:ext cx="7315200" cy="1028700"/>
           </a:xfrm>
           <a:prstGeom prst="rect">
@@ -4544,116 +5058,56 @@
 </file>
 
 <file path=ppt/theme/theme1.xml><?xml version="1.0" encoding="utf-8"?>
-<a:theme xmlns:a="http://schemas.openxmlformats.org/drawingml/2006/main" name="Office Theme">
+<a:theme xmlns:a="http://schemas.openxmlformats.org/drawingml/2006/main" name="Office テーマ">
   <a:themeElements>
-    <a:clrScheme name="Office">
+    <a:clrScheme name="ユーザー定義 1">
       <a:dk1>
-        <a:sysClr val="windowText" lastClr="000000"/>
+        <a:srgbClr val="282828"/>
       </a:dk1>
       <a:lt1>
         <a:sysClr val="window" lastClr="FFFFFF"/>
       </a:lt1>
       <a:dk2>
-        <a:srgbClr val="1F497D"/>
+        <a:srgbClr val="282828"/>
       </a:dk2>
       <a:lt2>
-        <a:srgbClr val="EEECE1"/>
+        <a:srgbClr val="E8E8E8"/>
       </a:lt2>
       <a:accent1>
-        <a:srgbClr val="4F81BD"/>
+        <a:srgbClr val="156082"/>
       </a:accent1>
       <a:accent2>
-        <a:srgbClr val="C0504D"/>
+        <a:srgbClr val="E97132"/>
       </a:accent2>
       <a:accent3>
-        <a:srgbClr val="9BBB59"/>
+        <a:srgbClr val="196B24"/>
       </a:accent3>
       <a:accent4>
-        <a:srgbClr val="8064A2"/>
+        <a:srgbClr val="0F9ED5"/>
       </a:accent4>
       <a:accent5>
-        <a:srgbClr val="4BACC6"/>
+        <a:srgbClr val="A02B93"/>
       </a:accent5>
       <a:accent6>
-        <a:srgbClr val="F79646"/>
+        <a:srgbClr val="4EA72E"/>
       </a:accent6>
       <a:hlink>
-        <a:srgbClr val="0000FF"/>
+        <a:srgbClr val="467886"/>
       </a:hlink>
       <a:folHlink>
-        <a:srgbClr val="800080"/>
+        <a:srgbClr val="96607D"/>
       </a:folHlink>
     </a:clrScheme>
-    <a:fontScheme name="Office">
+    <a:fontScheme name="ユーザー定義 2">
       <a:majorFont>
-        <a:latin typeface="Calibri"/>
-        <a:ea typeface=""/>
+        <a:latin typeface="Meiryo"/>
+        <a:ea typeface="Meiryo"/>
         <a:cs typeface=""/>
-        <a:font script="Jpan" typeface="ＭＳ Ｐゴシック"/>
-        <a:font script="Hang" typeface="맑은 고딕"/>
-        <a:font script="Hans" typeface="宋体"/>
-        <a:font script="Hant" typeface="新細明體"/>
-        <a:font script="Arab" typeface="Times New Roman"/>
-        <a:font script="Hebr" typeface="Times New Roman"/>
-        <a:font script="Thai" typeface="Angsana New"/>
-        <a:font script="Ethi" typeface="Nyala"/>
-        <a:font script="Beng" typeface="Vrinda"/>
-        <a:font script="Gujr" typeface="Shruti"/>
-        <a:font script="Khmr" typeface="MoolBoran"/>
-        <a:font script="Knda" typeface="Tunga"/>
-        <a:font script="Guru" typeface="Raavi"/>
-        <a:font script="Cans" typeface="Euphemia"/>
-        <a:font script="Cher" typeface="Plantagenet Cherokee"/>
-        <a:font script="Yiii" typeface="Microsoft Yi Baiti"/>
-        <a:font script="Tibt" typeface="Microsoft Himalaya"/>
-        <a:font script="Thaa" typeface="MV Boli"/>
-        <a:font script="Deva" typeface="Mangal"/>
-        <a:font script="Telu" typeface="Gautami"/>
-        <a:font script="Taml" typeface="Latha"/>
-        <a:font script="Syrc" typeface="Estrangelo Edessa"/>
-        <a:font script="Orya" typeface="Kalinga"/>
-        <a:font script="Mlym" typeface="Kartika"/>
-        <a:font script="Laoo" typeface="DokChampa"/>
-        <a:font script="Sinh" typeface="Iskoola Pota"/>
-        <a:font script="Mong" typeface="Mongolian Baiti"/>
-        <a:font script="Viet" typeface="Times New Roman"/>
-        <a:font script="Uigh" typeface="Microsoft Uighur"/>
-        <a:font script="Geor" typeface="Sylfaen"/>
       </a:majorFont>
       <a:minorFont>
-        <a:latin typeface="Calibri"/>
-        <a:ea typeface=""/>
+        <a:latin typeface="Meiryo"/>
+        <a:ea typeface="Meiryo"/>
         <a:cs typeface=""/>
-        <a:font script="Jpan" typeface="ＭＳ Ｐゴシック"/>
-        <a:font script="Hang" typeface="맑은 고딕"/>
-        <a:font script="Hans" typeface="宋体"/>
-        <a:font script="Hant" typeface="新細明體"/>
-        <a:font script="Arab" typeface="Arial"/>
-        <a:font script="Hebr" typeface="Arial"/>
-        <a:font script="Thai" typeface="Cordia New"/>
-        <a:font script="Ethi" typeface="Nyala"/>
-        <a:font script="Beng" typeface="Vrinda"/>
-        <a:font script="Gujr" typeface="Shruti"/>
-        <a:font script="Khmr" typeface="DaunPenh"/>
-        <a:font script="Knda" typeface="Tunga"/>
-        <a:font script="Guru" typeface="Raavi"/>
-        <a:font script="Cans" typeface="Euphemia"/>
-        <a:font script="Cher" typeface="Plantagenet Cherokee"/>
-        <a:font script="Yiii" typeface="Microsoft Yi Baiti"/>
-        <a:font script="Tibt" typeface="Microsoft Himalaya"/>
-        <a:font script="Thaa" typeface="MV Boli"/>
-        <a:font script="Deva" typeface="Mangal"/>
-        <a:font script="Telu" typeface="Gautami"/>
-        <a:font script="Taml" typeface="Latha"/>
-        <a:font script="Syrc" typeface="Estrangelo Edessa"/>
-        <a:font script="Orya" typeface="Kalinga"/>
-        <a:font script="Mlym" typeface="Kartika"/>
-        <a:font script="Laoo" typeface="DokChampa"/>
-        <a:font script="Sinh" typeface="Iskoola Pota"/>
-        <a:font script="Mong" typeface="Mongolian Baiti"/>
-        <a:font script="Viet" typeface="Arial"/>
-        <a:font script="Uigh" typeface="Microsoft Uighur"/>
-        <a:font script="Geor" typeface="Sylfaen"/>
       </a:minorFont>
     </a:fontScheme>
     <a:fmtScheme name="Office">
@@ -4665,180 +5119,136 @@
           <a:gsLst>
             <a:gs pos="0">
               <a:schemeClr val="phClr">
-                <a:tint val="50000"/>
-                <a:satMod val="300000"/>
+                <a:lumMod val="110000"/>
+                <a:satMod val="105000"/>
+                <a:tint val="67000"/>
               </a:schemeClr>
             </a:gs>
-            <a:gs pos="35000">
+            <a:gs pos="50000">
               <a:schemeClr val="phClr">
-                <a:tint val="37000"/>
-                <a:satMod val="300000"/>
+                <a:lumMod val="105000"/>
+                <a:satMod val="103000"/>
+                <a:tint val="73000"/>
               </a:schemeClr>
             </a:gs>
             <a:gs pos="100000">
               <a:schemeClr val="phClr">
-                <a:tint val="15000"/>
-                <a:satMod val="350000"/>
+                <a:lumMod val="105000"/>
+                <a:satMod val="109000"/>
+                <a:tint val="81000"/>
               </a:schemeClr>
             </a:gs>
           </a:gsLst>
-          <a:lin ang="16200000" scaled="1"/>
+          <a:lin ang="5400000" scaled="0"/>
         </a:gradFill>
         <a:gradFill rotWithShape="1">
           <a:gsLst>
             <a:gs pos="0">
               <a:schemeClr val="phClr">
-                <a:tint val="100000"/>
+                <a:satMod val="103000"/>
+                <a:lumMod val="102000"/>
+                <a:tint val="94000"/>
+              </a:schemeClr>
+            </a:gs>
+            <a:gs pos="50000">
+              <a:schemeClr val="phClr">
+                <a:satMod val="110000"/>
+                <a:lumMod val="100000"/>
                 <a:shade val="100000"/>
-                <a:satMod val="130000"/>
               </a:schemeClr>
             </a:gs>
             <a:gs pos="100000">
               <a:schemeClr val="phClr">
-                <a:tint val="50000"/>
-                <a:shade val="100000"/>
-                <a:satMod val="350000"/>
+                <a:lumMod val="99000"/>
+                <a:satMod val="120000"/>
+                <a:shade val="78000"/>
               </a:schemeClr>
             </a:gs>
           </a:gsLst>
-          <a:lin ang="16200000" scaled="0"/>
+          <a:lin ang="5400000" scaled="0"/>
         </a:gradFill>
       </a:fillStyleLst>
       <a:lnStyleLst>
-        <a:ln w="9525" cap="flat" cmpd="sng" algn="ctr">
+        <a:ln w="12700" cap="flat" cmpd="sng" algn="ctr">
           <a:solidFill>
-            <a:schemeClr val="phClr">
-              <a:shade val="95000"/>
-              <a:satMod val="105000"/>
-            </a:schemeClr>
+            <a:schemeClr val="phClr"/>
           </a:solidFill>
           <a:prstDash val="solid"/>
+          <a:miter lim="800000"/>
+        </a:ln>
+        <a:ln w="19050" cap="flat" cmpd="sng" algn="ctr">
+          <a:solidFill>
+            <a:schemeClr val="phClr"/>
+          </a:solidFill>
+          <a:prstDash val="solid"/>
+          <a:miter lim="800000"/>
         </a:ln>
         <a:ln w="25400" cap="flat" cmpd="sng" algn="ctr">
           <a:solidFill>
             <a:schemeClr val="phClr"/>
           </a:solidFill>
           <a:prstDash val="solid"/>
-        </a:ln>
-        <a:ln w="38100" cap="flat" cmpd="sng" algn="ctr">
-          <a:solidFill>
-            <a:schemeClr val="phClr"/>
-          </a:solidFill>
-          <a:prstDash val="solid"/>
+          <a:miter lim="800000"/>
         </a:ln>
       </a:lnStyleLst>
       <a:effectStyleLst>
         <a:effectStyle>
+          <a:effectLst/>
+        </a:effectStyle>
+        <a:effectStyle>
+          <a:effectLst/>
+        </a:effectStyle>
+        <a:effectStyle>
           <a:effectLst>
-            <a:outerShdw blurRad="40000" dist="20000" dir="5400000" rotWithShape="0">
+            <a:outerShdw blurRad="57150" dist="19050" dir="5400000" algn="ctr" rotWithShape="0">
               <a:srgbClr val="000000">
-                <a:alpha val="38000"/>
+                <a:alpha val="63000"/>
               </a:srgbClr>
             </a:outerShdw>
           </a:effectLst>
-        </a:effectStyle>
-        <a:effectStyle>
-          <a:effectLst>
-            <a:outerShdw blurRad="40000" dist="23000" dir="5400000" rotWithShape="0">
-              <a:srgbClr val="000000">
-                <a:alpha val="35000"/>
-              </a:srgbClr>
-            </a:outerShdw>
-          </a:effectLst>
-        </a:effectStyle>
-        <a:effectStyle>
-          <a:effectLst>
-            <a:outerShdw blurRad="40000" dist="23000" dir="5400000" rotWithShape="0">
-              <a:srgbClr val="000000">
-                <a:alpha val="35000"/>
-              </a:srgbClr>
-            </a:outerShdw>
-          </a:effectLst>
-          <a:scene3d>
-            <a:camera prst="orthographicFront">
-              <a:rot lat="0" lon="0" rev="0"/>
-            </a:camera>
-            <a:lightRig rig="threePt" dir="t">
-              <a:rot lat="0" lon="0" rev="1200000"/>
-            </a:lightRig>
-          </a:scene3d>
-          <a:sp3d>
-            <a:bevelT w="63500" h="25400"/>
-          </a:sp3d>
         </a:effectStyle>
       </a:effectStyleLst>
       <a:bgFillStyleLst>
         <a:solidFill>
           <a:schemeClr val="phClr"/>
         </a:solidFill>
+        <a:solidFill>
+          <a:schemeClr val="phClr">
+            <a:tint val="95000"/>
+            <a:satMod val="170000"/>
+          </a:schemeClr>
+        </a:solidFill>
         <a:gradFill rotWithShape="1">
           <a:gsLst>
             <a:gs pos="0">
               <a:schemeClr val="phClr">
-                <a:tint val="40000"/>
-                <a:satMod val="350000"/>
+                <a:tint val="93000"/>
+                <a:satMod val="150000"/>
+                <a:shade val="98000"/>
+                <a:lumMod val="102000"/>
               </a:schemeClr>
             </a:gs>
-            <a:gs pos="40000">
+            <a:gs pos="50000">
               <a:schemeClr val="phClr">
-                <a:tint val="45000"/>
-                <a:shade val="99000"/>
-                <a:satMod val="350000"/>
+                <a:tint val="98000"/>
+                <a:satMod val="130000"/>
+                <a:shade val="90000"/>
+                <a:lumMod val="103000"/>
               </a:schemeClr>
             </a:gs>
             <a:gs pos="100000">
               <a:schemeClr val="phClr">
-                <a:shade val="20000"/>
-                <a:satMod val="255000"/>
+                <a:shade val="63000"/>
+                <a:satMod val="120000"/>
               </a:schemeClr>
             </a:gs>
           </a:gsLst>
-          <a:path path="circle">
-            <a:fillToRect l="50000" t="-80000" r="50000" b="180000"/>
-          </a:path>
-        </a:gradFill>
-        <a:gradFill rotWithShape="1">
-          <a:gsLst>
-            <a:gs pos="0">
-              <a:schemeClr val="phClr">
-                <a:tint val="80000"/>
-                <a:satMod val="300000"/>
-              </a:schemeClr>
-            </a:gs>
-            <a:gs pos="100000">
-              <a:schemeClr val="phClr">
-                <a:shade val="30000"/>
-                <a:satMod val="200000"/>
-              </a:schemeClr>
-            </a:gs>
-          </a:gsLst>
-          <a:path path="circle">
-            <a:fillToRect l="50000" t="50000" r="50000" b="50000"/>
-          </a:path>
+          <a:lin ang="5400000" scaled="0"/>
         </a:gradFill>
       </a:bgFillStyleLst>
     </a:fmtScheme>
   </a:themeElements>
   <a:objectDefaults>
-    <a:spDef>
-      <a:spPr/>
-      <a:bodyPr/>
-      <a:lstStyle/>
-      <a:style>
-        <a:lnRef idx="1">
-          <a:schemeClr val="accent1"/>
-        </a:lnRef>
-        <a:fillRef idx="3">
-          <a:schemeClr val="accent1"/>
-        </a:fillRef>
-        <a:effectRef idx="2">
-          <a:schemeClr val="accent1"/>
-        </a:effectRef>
-        <a:fontRef idx="minor">
-          <a:schemeClr val="lt1"/>
-        </a:fontRef>
-      </a:style>
-    </a:spDef>
     <a:lnDef>
       <a:spPr/>
       <a:bodyPr/>
@@ -4860,5 +5270,10 @@
     </a:lnDef>
   </a:objectDefaults>
   <a:extraClrSchemeLst/>
+  <a:extLst>
+    <a:ext uri="{05A4C25C-085E-4340-85A3-A5531E510DB2}">
+      <thm15:themeFamily xmlns:thm15="http://schemas.microsoft.com/office/thememl/2012/main" name="Office Theme" id="{2E142A2C-CD16-42D6-873A-C26D2A0506FA}" vid="{1BDDFF52-6CD6-40A5-AB3C-68EB2F1E4D0A}"/>
+    </a:ext>
+  </a:extLst>
 </a:theme>
 </file>
</xml_diff>